<commit_message>
Added first example of function template
</commit_message>
<xml_diff>
--- a/CPlusPlus/05_essential_cpp_templates.pptx
+++ b/CPlusPlus/05_essential_cpp_templates.pptx
@@ -3726,14 +3726,37 @@
       </p:sp>
       <p:sp>
         <p:nvSpPr>
-          <p:cNvPr id="5" name="TextBox 4"/>
+          <p:cNvPr id="7" name="Slide Number Placeholder 6"/>
+          <p:cNvSpPr>
+            <a:spLocks noGrp="1"/>
+          </p:cNvSpPr>
+          <p:nvPr>
+            <p:ph type="sldNum" sz="quarter" idx="12"/>
+          </p:nvPr>
+        </p:nvSpPr>
+        <p:spPr/>
+        <p:txBody>
+          <a:bodyPr/>
+          <a:lstStyle/>
+          <a:p>
+            <a:fld id="{9CEF4966-5219-4577-B301-14467D565841}" type="slidenum">
+              <a:rPr lang="en-US" smtClean="0"/>
+              <a:t>3</a:t>
+            </a:fld>
+            <a:endParaRPr lang="en-US"/>
+          </a:p>
+        </p:txBody>
+      </p:sp>
+      <p:sp>
+        <p:nvSpPr>
+          <p:cNvPr id="6" name="TextBox 5"/>
           <p:cNvSpPr txBox="1"/>
           <p:nvPr/>
         </p:nvSpPr>
         <p:spPr>
           <a:xfrm>
-            <a:off x="2802961" y="4189065"/>
-            <a:ext cx="3538077" cy="1323439"/>
+            <a:off x="304186" y="1527083"/>
+            <a:ext cx="3848100" cy="1569660"/>
           </a:xfrm>
           <a:prstGeom prst="rect">
             <a:avLst/>
@@ -3743,6 +3766,11 @@
               <a:lumMod val="75000"/>
             </a:schemeClr>
           </a:solidFill>
+          <a:ln>
+            <a:solidFill>
+              <a:schemeClr val="tx1"/>
+            </a:solidFill>
+          </a:ln>
         </p:spPr>
         <p:txBody>
           <a:bodyPr wrap="square" rtlCol="0">
@@ -3751,105 +3779,170 @@
           <a:lstStyle/>
           <a:p>
             <a:r>
-              <a:rPr lang="nn-NO" sz="1600" dirty="0" smtClean="0">
+              <a:rPr lang="en-US" sz="1600" dirty="0" smtClean="0">
                 <a:latin typeface="Courier New" pitchFamily="49" charset="0"/>
                 <a:cs typeface="Courier New" pitchFamily="49" charset="0"/>
               </a:rPr>
-              <a:t>void swap(T&amp; v1, T&amp; v2) {</a:t>
-            </a:r>
-          </a:p>
-          <a:p>
-            <a:r>
-              <a:rPr lang="nn-NO" sz="1600" dirty="0">
+              <a:t>void </a:t>
+            </a:r>
+            <a:r>
+              <a:rPr lang="en-US" sz="1600" dirty="0" err="1" smtClean="0">
+                <a:latin typeface="Courier New" pitchFamily="49" charset="0"/>
+                <a:cs typeface="Courier New" pitchFamily="49" charset="0"/>
+              </a:rPr>
+              <a:t>swap_val</a:t>
+            </a:r>
+            <a:r>
+              <a:rPr lang="en-US" sz="1600" dirty="0" smtClean="0">
+                <a:latin typeface="Courier New" pitchFamily="49" charset="0"/>
+                <a:cs typeface="Courier New" pitchFamily="49" charset="0"/>
+              </a:rPr>
+              <a:t>(</a:t>
+            </a:r>
+            <a:r>
+              <a:rPr lang="en-US" sz="1600" dirty="0" err="1" smtClean="0">
+                <a:latin typeface="Courier New" pitchFamily="49" charset="0"/>
+                <a:cs typeface="Courier New" pitchFamily="49" charset="0"/>
+              </a:rPr>
+              <a:t>int</a:t>
+            </a:r>
+            <a:r>
+              <a:rPr lang="en-US" sz="1600" dirty="0" smtClean="0">
+                <a:latin typeface="Courier New" pitchFamily="49" charset="0"/>
+                <a:cs typeface="Courier New" pitchFamily="49" charset="0"/>
+              </a:rPr>
+              <a:t>&amp; x, </a:t>
+            </a:r>
+            <a:r>
+              <a:rPr lang="en-US" sz="1600" dirty="0" err="1" smtClean="0">
+                <a:latin typeface="Courier New" pitchFamily="49" charset="0"/>
+                <a:cs typeface="Courier New" pitchFamily="49" charset="0"/>
+              </a:rPr>
+              <a:t>int</a:t>
+            </a:r>
+            <a:r>
+              <a:rPr lang="en-US" sz="1600" dirty="0" smtClean="0">
+                <a:latin typeface="Courier New" pitchFamily="49" charset="0"/>
+                <a:cs typeface="Courier New" pitchFamily="49" charset="0"/>
+              </a:rPr>
+              <a:t>&amp; y) {</a:t>
+            </a:r>
+          </a:p>
+          <a:p>
+            <a:r>
+              <a:rPr lang="en-US" sz="1600" dirty="0">
                 <a:latin typeface="Courier New" pitchFamily="49" charset="0"/>
                 <a:cs typeface="Courier New" pitchFamily="49" charset="0"/>
               </a:rPr>
               <a:t> </a:t>
             </a:r>
             <a:r>
-              <a:rPr lang="nn-NO" sz="1600" dirty="0" smtClean="0">
+              <a:rPr lang="en-US" sz="1600" dirty="0" smtClean="0">
                 <a:latin typeface="Courier New" pitchFamily="49" charset="0"/>
                 <a:cs typeface="Courier New" pitchFamily="49" charset="0"/>
               </a:rPr>
-              <a:t>   T tmp = v1;</a:t>
-            </a:r>
-          </a:p>
-          <a:p>
-            <a:r>
-              <a:rPr lang="nn-NO" sz="1600" dirty="0">
+              <a:t>   </a:t>
+            </a:r>
+            <a:r>
+              <a:rPr lang="en-US" sz="1600" dirty="0" smtClean="0">
+                <a:latin typeface="Courier New" pitchFamily="49" charset="0"/>
+                <a:cs typeface="Courier New" pitchFamily="49" charset="0"/>
+              </a:rPr>
+              <a:t>auto </a:t>
+            </a:r>
+            <a:r>
+              <a:rPr lang="en-US" sz="1600" dirty="0" err="1" smtClean="0">
+                <a:latin typeface="Courier New" pitchFamily="49" charset="0"/>
+                <a:cs typeface="Courier New" pitchFamily="49" charset="0"/>
+              </a:rPr>
+              <a:t>tmp</a:t>
+            </a:r>
+            <a:r>
+              <a:rPr lang="en-US" sz="1600" dirty="0" smtClean="0">
                 <a:latin typeface="Courier New" pitchFamily="49" charset="0"/>
                 <a:cs typeface="Courier New" pitchFamily="49" charset="0"/>
               </a:rPr>
               <a:t> </a:t>
             </a:r>
             <a:r>
-              <a:rPr lang="nn-NO" sz="1600" dirty="0" smtClean="0">
+              <a:rPr lang="en-US" sz="1600" dirty="0" smtClean="0">
                 <a:latin typeface="Courier New" pitchFamily="49" charset="0"/>
                 <a:cs typeface="Courier New" pitchFamily="49" charset="0"/>
               </a:rPr>
-              <a:t>   v1 = v2;</a:t>
-            </a:r>
-          </a:p>
-          <a:p>
-            <a:r>
-              <a:rPr lang="nn-NO" sz="1600" dirty="0">
+              <a:t>{x};</a:t>
+            </a:r>
+          </a:p>
+          <a:p>
+            <a:r>
+              <a:rPr lang="en-US" sz="1600" dirty="0">
                 <a:latin typeface="Courier New" pitchFamily="49" charset="0"/>
                 <a:cs typeface="Courier New" pitchFamily="49" charset="0"/>
               </a:rPr>
               <a:t> </a:t>
             </a:r>
             <a:r>
-              <a:rPr lang="nn-NO" sz="1600" dirty="0" smtClean="0">
+              <a:rPr lang="en-US" sz="1600" dirty="0" smtClean="0">
                 <a:latin typeface="Courier New" pitchFamily="49" charset="0"/>
                 <a:cs typeface="Courier New" pitchFamily="49" charset="0"/>
               </a:rPr>
-              <a:t>   v2 = tmp;</a:t>
-            </a:r>
-          </a:p>
-          <a:p>
-            <a:r>
-              <a:rPr lang="nn-NO" sz="1600" dirty="0">
+              <a:t>   x = y;</a:t>
+            </a:r>
+          </a:p>
+          <a:p>
+            <a:r>
+              <a:rPr lang="en-US" sz="1600" dirty="0">
+                <a:latin typeface="Courier New" pitchFamily="49" charset="0"/>
+                <a:cs typeface="Courier New" pitchFamily="49" charset="0"/>
+              </a:rPr>
+              <a:t> </a:t>
+            </a:r>
+            <a:r>
+              <a:rPr lang="en-US" sz="1600" dirty="0" smtClean="0">
+                <a:latin typeface="Courier New" pitchFamily="49" charset="0"/>
+                <a:cs typeface="Courier New" pitchFamily="49" charset="0"/>
+              </a:rPr>
+              <a:t>   y = </a:t>
+            </a:r>
+            <a:r>
+              <a:rPr lang="en-US" sz="1600" dirty="0" err="1" smtClean="0">
+                <a:latin typeface="Courier New" pitchFamily="49" charset="0"/>
+                <a:cs typeface="Courier New" pitchFamily="49" charset="0"/>
+              </a:rPr>
+              <a:t>tmp</a:t>
+            </a:r>
+            <a:r>
+              <a:rPr lang="en-US" sz="1600" dirty="0" smtClean="0">
+                <a:latin typeface="Courier New" pitchFamily="49" charset="0"/>
+                <a:cs typeface="Courier New" pitchFamily="49" charset="0"/>
+              </a:rPr>
+              <a:t>;</a:t>
+            </a:r>
+          </a:p>
+          <a:p>
+            <a:r>
+              <a:rPr lang="en-US" sz="1600" dirty="0">
                 <a:latin typeface="Courier New" pitchFamily="49" charset="0"/>
                 <a:cs typeface="Courier New" pitchFamily="49" charset="0"/>
               </a:rPr>
               <a:t>}</a:t>
             </a:r>
-          </a:p>
-        </p:txBody>
-      </p:sp>
-      <p:sp>
-        <p:nvSpPr>
-          <p:cNvPr id="7" name="Slide Number Placeholder 6"/>
-          <p:cNvSpPr>
-            <a:spLocks noGrp="1"/>
-          </p:cNvSpPr>
-          <p:nvPr>
-            <p:ph type="sldNum" sz="quarter" idx="12"/>
-          </p:nvPr>
-        </p:nvSpPr>
-        <p:spPr/>
-        <p:txBody>
-          <a:bodyPr/>
-          <a:lstStyle/>
-          <a:p>
-            <a:fld id="{9CEF4966-5219-4577-B301-14467D565841}" type="slidenum">
-              <a:rPr lang="en-US" smtClean="0"/>
-              <a:t>3</a:t>
-            </a:fld>
-            <a:endParaRPr lang="en-US"/>
-          </a:p>
-        </p:txBody>
-      </p:sp>
-      <p:sp>
-        <p:nvSpPr>
-          <p:cNvPr id="6" name="TextBox 5"/>
+            <a:endParaRPr lang="en-US" sz="1600" dirty="0" smtClean="0">
+              <a:latin typeface="Courier New" pitchFamily="49" charset="0"/>
+              <a:cs typeface="Courier New" pitchFamily="49" charset="0"/>
+            </a:endParaRPr>
+          </a:p>
+        </p:txBody>
+      </p:sp>
+      <p:sp>
+        <p:nvSpPr>
+          <p:cNvPr id="8" name="TextBox 7"/>
           <p:cNvSpPr txBox="1"/>
           <p:nvPr/>
         </p:nvSpPr>
         <p:spPr>
           <a:xfrm>
-            <a:off x="304186" y="2038361"/>
-            <a:ext cx="3848100" cy="1323439"/>
+            <a:off x="2762864" y="2121872"/>
+            <a:ext cx="4265357" cy="1569660"/>
           </a:xfrm>
           <a:prstGeom prst="rect">
             <a:avLst/>
@@ -3859,6 +3952,11 @@
               <a:lumMod val="75000"/>
             </a:schemeClr>
           </a:solidFill>
+          <a:ln>
+            <a:solidFill>
+              <a:schemeClr val="tx1"/>
+            </a:solidFill>
+          </a:ln>
         </p:spPr>
         <p:txBody>
           <a:bodyPr wrap="square" rtlCol="0">
@@ -3874,39 +3972,53 @@
               <a:t>void </a:t>
             </a:r>
             <a:r>
+              <a:rPr lang="en-US" sz="1600" dirty="0" err="1" smtClean="0">
+                <a:latin typeface="Courier New" pitchFamily="49" charset="0"/>
+                <a:cs typeface="Courier New" pitchFamily="49" charset="0"/>
+              </a:rPr>
+              <a:t>swap_val</a:t>
+            </a:r>
+            <a:r>
               <a:rPr lang="en-US" sz="1600" dirty="0" smtClean="0">
                 <a:latin typeface="Courier New" pitchFamily="49" charset="0"/>
                 <a:cs typeface="Courier New" pitchFamily="49" charset="0"/>
               </a:rPr>
-              <a:t>swap(</a:t>
-            </a:r>
-            <a:r>
-              <a:rPr lang="en-US" sz="1600" dirty="0" err="1" smtClean="0">
-                <a:latin typeface="Courier New" pitchFamily="49" charset="0"/>
-                <a:cs typeface="Courier New" pitchFamily="49" charset="0"/>
-              </a:rPr>
-              <a:t>int</a:t>
+              <a:t>(</a:t>
             </a:r>
             <a:r>
               <a:rPr lang="en-US" sz="1600" dirty="0" smtClean="0">
                 <a:latin typeface="Courier New" pitchFamily="49" charset="0"/>
                 <a:cs typeface="Courier New" pitchFamily="49" charset="0"/>
               </a:rPr>
-              <a:t>&amp; x, </a:t>
-            </a:r>
-            <a:r>
-              <a:rPr lang="en-US" sz="1600" dirty="0" err="1" smtClean="0">
-                <a:latin typeface="Courier New" pitchFamily="49" charset="0"/>
-                <a:cs typeface="Courier New" pitchFamily="49" charset="0"/>
-              </a:rPr>
-              <a:t>int</a:t>
+              <a:t>double</a:t>
             </a:r>
             <a:r>
               <a:rPr lang="en-US" sz="1600" dirty="0" smtClean="0">
                 <a:latin typeface="Courier New" pitchFamily="49" charset="0"/>
                 <a:cs typeface="Courier New" pitchFamily="49" charset="0"/>
               </a:rPr>
-              <a:t>&amp; y) {</a:t>
+              <a:t>&amp; </a:t>
+            </a:r>
+            <a:r>
+              <a:rPr lang="en-US" sz="1600" dirty="0" smtClean="0">
+                <a:latin typeface="Courier New" pitchFamily="49" charset="0"/>
+                <a:cs typeface="Courier New" pitchFamily="49" charset="0"/>
+              </a:rPr>
+              <a:t>x, </a:t>
+            </a:r>
+            <a:r>
+              <a:rPr lang="en-US" sz="1600" dirty="0" smtClean="0">
+                <a:latin typeface="Courier New" pitchFamily="49" charset="0"/>
+                <a:cs typeface="Courier New" pitchFamily="49" charset="0"/>
+              </a:rPr>
+              <a:t>double&amp; </a:t>
+            </a:r>
+            <a:r>
+              <a:rPr lang="en-US" sz="1600" dirty="0" smtClean="0">
+                <a:latin typeface="Courier New" pitchFamily="49" charset="0"/>
+                <a:cs typeface="Courier New" pitchFamily="49" charset="0"/>
+              </a:rPr>
+              <a:t>y) {</a:t>
             </a:r>
           </a:p>
           <a:p>
@@ -3925,11 +4037,18 @@
               <a:t>   </a:t>
             </a:r>
             <a:r>
+              <a:rPr lang="en-US" sz="1600" dirty="0" smtClean="0">
+                <a:latin typeface="Courier New" pitchFamily="49" charset="0"/>
+                <a:cs typeface="Courier New" pitchFamily="49" charset="0"/>
+              </a:rPr>
+              <a:t>auto </a:t>
+            </a:r>
+            <a:r>
               <a:rPr lang="en-US" sz="1600" dirty="0" err="1" smtClean="0">
                 <a:latin typeface="Courier New" pitchFamily="49" charset="0"/>
                 <a:cs typeface="Courier New" pitchFamily="49" charset="0"/>
               </a:rPr>
-              <a:t>int</a:t>
+              <a:t>tmp</a:t>
             </a:r>
             <a:r>
               <a:rPr lang="en-US" sz="1600" dirty="0" smtClean="0">
@@ -3939,6 +4058,45 @@
               <a:t> </a:t>
             </a:r>
             <a:r>
+              <a:rPr lang="en-US" sz="1600" dirty="0" smtClean="0">
+                <a:latin typeface="Courier New" pitchFamily="49" charset="0"/>
+                <a:cs typeface="Courier New" pitchFamily="49" charset="0"/>
+              </a:rPr>
+              <a:t>{x};</a:t>
+            </a:r>
+          </a:p>
+          <a:p>
+            <a:r>
+              <a:rPr lang="en-US" sz="1600" dirty="0">
+                <a:latin typeface="Courier New" pitchFamily="49" charset="0"/>
+                <a:cs typeface="Courier New" pitchFamily="49" charset="0"/>
+              </a:rPr>
+              <a:t> </a:t>
+            </a:r>
+            <a:r>
+              <a:rPr lang="en-US" sz="1600" dirty="0" smtClean="0">
+                <a:latin typeface="Courier New" pitchFamily="49" charset="0"/>
+                <a:cs typeface="Courier New" pitchFamily="49" charset="0"/>
+              </a:rPr>
+              <a:t>   x = y;</a:t>
+            </a:r>
+          </a:p>
+          <a:p>
+            <a:r>
+              <a:rPr lang="en-US" sz="1600" dirty="0">
+                <a:latin typeface="Courier New" pitchFamily="49" charset="0"/>
+                <a:cs typeface="Courier New" pitchFamily="49" charset="0"/>
+              </a:rPr>
+              <a:t> </a:t>
+            </a:r>
+            <a:r>
+              <a:rPr lang="en-US" sz="1600" dirty="0" smtClean="0">
+                <a:latin typeface="Courier New" pitchFamily="49" charset="0"/>
+                <a:cs typeface="Courier New" pitchFamily="49" charset="0"/>
+              </a:rPr>
+              <a:t>   y = </a:t>
+            </a:r>
+            <a:r>
               <a:rPr lang="en-US" sz="1600" dirty="0" err="1" smtClean="0">
                 <a:latin typeface="Courier New" pitchFamily="49" charset="0"/>
                 <a:cs typeface="Courier New" pitchFamily="49" charset="0"/>
@@ -3950,52 +4108,6 @@
                 <a:latin typeface="Courier New" pitchFamily="49" charset="0"/>
                 <a:cs typeface="Courier New" pitchFamily="49" charset="0"/>
               </a:rPr>
-              <a:t> {x};</a:t>
-            </a:r>
-          </a:p>
-          <a:p>
-            <a:r>
-              <a:rPr lang="en-US" sz="1600" dirty="0">
-                <a:latin typeface="Courier New" pitchFamily="49" charset="0"/>
-                <a:cs typeface="Courier New" pitchFamily="49" charset="0"/>
-              </a:rPr>
-              <a:t> </a:t>
-            </a:r>
-            <a:r>
-              <a:rPr lang="en-US" sz="1600" dirty="0" smtClean="0">
-                <a:latin typeface="Courier New" pitchFamily="49" charset="0"/>
-                <a:cs typeface="Courier New" pitchFamily="49" charset="0"/>
-              </a:rPr>
-              <a:t>   x = y;</a:t>
-            </a:r>
-          </a:p>
-          <a:p>
-            <a:r>
-              <a:rPr lang="en-US" sz="1600" dirty="0">
-                <a:latin typeface="Courier New" pitchFamily="49" charset="0"/>
-                <a:cs typeface="Courier New" pitchFamily="49" charset="0"/>
-              </a:rPr>
-              <a:t> </a:t>
-            </a:r>
-            <a:r>
-              <a:rPr lang="en-US" sz="1600" dirty="0" smtClean="0">
-                <a:latin typeface="Courier New" pitchFamily="49" charset="0"/>
-                <a:cs typeface="Courier New" pitchFamily="49" charset="0"/>
-              </a:rPr>
-              <a:t>   y = </a:t>
-            </a:r>
-            <a:r>
-              <a:rPr lang="en-US" sz="1600" dirty="0" err="1" smtClean="0">
-                <a:latin typeface="Courier New" pitchFamily="49" charset="0"/>
-                <a:cs typeface="Courier New" pitchFamily="49" charset="0"/>
-              </a:rPr>
-              <a:t>tmp</a:t>
-            </a:r>
-            <a:r>
-              <a:rPr lang="en-US" sz="1600" dirty="0" smtClean="0">
-                <a:latin typeface="Courier New" pitchFamily="49" charset="0"/>
-                <a:cs typeface="Courier New" pitchFamily="49" charset="0"/>
-              </a:rPr>
               <a:t>;</a:t>
             </a:r>
           </a:p>
@@ -4014,180 +4126,317 @@
           </a:p>
         </p:txBody>
       </p:sp>
-      <p:sp>
-        <p:nvSpPr>
-          <p:cNvPr id="8" name="TextBox 7"/>
-          <p:cNvSpPr txBox="1"/>
+      <p:grpSp>
+        <p:nvGrpSpPr>
+          <p:cNvPr id="16" name="Group 15"/>
+          <p:cNvGrpSpPr/>
           <p:nvPr/>
-        </p:nvSpPr>
-        <p:spPr>
+        </p:nvGrpSpPr>
+        <p:grpSpPr>
           <a:xfrm>
-            <a:off x="4572000" y="2021780"/>
-            <a:ext cx="4265357" cy="1323439"/>
+            <a:off x="6457950" y="3017356"/>
+            <a:ext cx="1682980" cy="979878"/>
+            <a:chOff x="6457950" y="2819376"/>
+            <a:chExt cx="1682980" cy="979878"/>
           </a:xfrm>
-          <a:prstGeom prst="rect">
-            <a:avLst/>
-          </a:prstGeom>
-          <a:solidFill>
-            <a:schemeClr val="bg1">
-              <a:lumMod val="75000"/>
-            </a:schemeClr>
-          </a:solidFill>
-        </p:spPr>
-        <p:txBody>
-          <a:bodyPr wrap="square" rtlCol="0">
-            <a:spAutoFit/>
-          </a:bodyPr>
-          <a:lstStyle/>
-          <a:p>
-            <a:r>
-              <a:rPr lang="en-US" sz="1600" dirty="0" smtClean="0">
-                <a:latin typeface="Courier New" pitchFamily="49" charset="0"/>
-                <a:cs typeface="Courier New" pitchFamily="49" charset="0"/>
-              </a:rPr>
-              <a:t>void swap(</a:t>
-            </a:r>
-            <a:r>
-              <a:rPr lang="en-US" sz="1600" dirty="0" smtClean="0">
-                <a:latin typeface="Courier New" pitchFamily="49" charset="0"/>
-                <a:cs typeface="Courier New" pitchFamily="49" charset="0"/>
-              </a:rPr>
-              <a:t>double</a:t>
-            </a:r>
-            <a:r>
-              <a:rPr lang="en-US" sz="1600" dirty="0" smtClean="0">
-                <a:latin typeface="Courier New" pitchFamily="49" charset="0"/>
-                <a:cs typeface="Courier New" pitchFamily="49" charset="0"/>
-              </a:rPr>
-              <a:t>&amp; </a:t>
-            </a:r>
-            <a:r>
-              <a:rPr lang="en-US" sz="1600" dirty="0" smtClean="0">
-                <a:latin typeface="Courier New" pitchFamily="49" charset="0"/>
-                <a:cs typeface="Courier New" pitchFamily="49" charset="0"/>
-              </a:rPr>
-              <a:t>x, </a:t>
-            </a:r>
-            <a:r>
-              <a:rPr lang="en-US" sz="1600" dirty="0" smtClean="0">
-                <a:latin typeface="Courier New" pitchFamily="49" charset="0"/>
-                <a:cs typeface="Courier New" pitchFamily="49" charset="0"/>
-              </a:rPr>
-              <a:t>double&amp; </a:t>
-            </a:r>
-            <a:r>
-              <a:rPr lang="en-US" sz="1600" dirty="0" smtClean="0">
-                <a:latin typeface="Courier New" pitchFamily="49" charset="0"/>
-                <a:cs typeface="Courier New" pitchFamily="49" charset="0"/>
-              </a:rPr>
-              <a:t>y) {</a:t>
-            </a:r>
-          </a:p>
-          <a:p>
-            <a:r>
-              <a:rPr lang="en-US" sz="1600" dirty="0">
-                <a:latin typeface="Courier New" pitchFamily="49" charset="0"/>
-                <a:cs typeface="Courier New" pitchFamily="49" charset="0"/>
-              </a:rPr>
-              <a:t> </a:t>
-            </a:r>
-            <a:r>
-              <a:rPr lang="en-US" sz="1600" dirty="0" smtClean="0">
-                <a:latin typeface="Courier New" pitchFamily="49" charset="0"/>
-                <a:cs typeface="Courier New" pitchFamily="49" charset="0"/>
-              </a:rPr>
-              <a:t>   </a:t>
-            </a:r>
-            <a:r>
-              <a:rPr lang="en-US" sz="1600" dirty="0" smtClean="0">
-                <a:latin typeface="Courier New" pitchFamily="49" charset="0"/>
-                <a:cs typeface="Courier New" pitchFamily="49" charset="0"/>
-              </a:rPr>
-              <a:t>double </a:t>
-            </a:r>
-            <a:r>
-              <a:rPr lang="en-US" sz="1600" dirty="0" err="1" smtClean="0">
-                <a:latin typeface="Courier New" pitchFamily="49" charset="0"/>
-                <a:cs typeface="Courier New" pitchFamily="49" charset="0"/>
-              </a:rPr>
-              <a:t>tmp</a:t>
-            </a:r>
-            <a:r>
-              <a:rPr lang="en-US" sz="1600" dirty="0" smtClean="0">
-                <a:latin typeface="Courier New" pitchFamily="49" charset="0"/>
-                <a:cs typeface="Courier New" pitchFamily="49" charset="0"/>
-              </a:rPr>
-              <a:t> </a:t>
-            </a:r>
-            <a:r>
-              <a:rPr lang="en-US" sz="1600" dirty="0" smtClean="0">
-                <a:latin typeface="Courier New" pitchFamily="49" charset="0"/>
-                <a:cs typeface="Courier New" pitchFamily="49" charset="0"/>
-              </a:rPr>
-              <a:t>{x};</a:t>
-            </a:r>
-          </a:p>
-          <a:p>
-            <a:r>
-              <a:rPr lang="en-US" sz="1600" dirty="0">
-                <a:latin typeface="Courier New" pitchFamily="49" charset="0"/>
-                <a:cs typeface="Courier New" pitchFamily="49" charset="0"/>
-              </a:rPr>
-              <a:t> </a:t>
-            </a:r>
-            <a:r>
-              <a:rPr lang="en-US" sz="1600" dirty="0" smtClean="0">
-                <a:latin typeface="Courier New" pitchFamily="49" charset="0"/>
-                <a:cs typeface="Courier New" pitchFamily="49" charset="0"/>
-              </a:rPr>
-              <a:t>   x = y;</a:t>
-            </a:r>
-          </a:p>
-          <a:p>
-            <a:r>
-              <a:rPr lang="en-US" sz="1600" dirty="0">
-                <a:latin typeface="Courier New" pitchFamily="49" charset="0"/>
-                <a:cs typeface="Courier New" pitchFamily="49" charset="0"/>
-              </a:rPr>
-              <a:t> </a:t>
-            </a:r>
-            <a:r>
-              <a:rPr lang="en-US" sz="1600" dirty="0" smtClean="0">
-                <a:latin typeface="Courier New" pitchFamily="49" charset="0"/>
-                <a:cs typeface="Courier New" pitchFamily="49" charset="0"/>
-              </a:rPr>
-              <a:t>   y = </a:t>
-            </a:r>
-            <a:r>
-              <a:rPr lang="en-US" sz="1600" dirty="0" err="1" smtClean="0">
-                <a:latin typeface="Courier New" pitchFamily="49" charset="0"/>
-                <a:cs typeface="Courier New" pitchFamily="49" charset="0"/>
-              </a:rPr>
-              <a:t>tmp</a:t>
-            </a:r>
-            <a:r>
-              <a:rPr lang="en-US" sz="1600" dirty="0" smtClean="0">
-                <a:latin typeface="Courier New" pitchFamily="49" charset="0"/>
-                <a:cs typeface="Courier New" pitchFamily="49" charset="0"/>
-              </a:rPr>
-              <a:t>;</a:t>
-            </a:r>
-          </a:p>
-          <a:p>
-            <a:r>
-              <a:rPr lang="en-US" sz="1600" dirty="0">
-                <a:latin typeface="Courier New" pitchFamily="49" charset="0"/>
-                <a:cs typeface="Courier New" pitchFamily="49" charset="0"/>
-              </a:rPr>
-              <a:t>}</a:t>
-            </a:r>
-            <a:endParaRPr lang="en-US" sz="1600" dirty="0" smtClean="0">
-              <a:latin typeface="Courier New" pitchFamily="49" charset="0"/>
-              <a:cs typeface="Courier New" pitchFamily="49" charset="0"/>
-            </a:endParaRPr>
-          </a:p>
-        </p:txBody>
-      </p:sp>
+        </p:grpSpPr>
+        <p:grpSp>
+          <p:nvGrpSpPr>
+            <p:cNvPr id="11" name="Group 10"/>
+            <p:cNvGrpSpPr/>
+            <p:nvPr/>
+          </p:nvGrpSpPr>
+          <p:grpSpPr>
+            <a:xfrm>
+              <a:off x="6457950" y="2819376"/>
+              <a:ext cx="786581" cy="923330"/>
+              <a:chOff x="393290" y="3303639"/>
+              <a:chExt cx="786581" cy="923330"/>
+            </a:xfrm>
+          </p:grpSpPr>
+          <p:sp>
+            <p:nvSpPr>
+              <p:cNvPr id="9" name="Rounded Rectangle 8"/>
+              <p:cNvSpPr/>
+              <p:nvPr/>
+            </p:nvSpPr>
+            <p:spPr>
+              <a:xfrm>
+                <a:off x="393290" y="3716594"/>
+                <a:ext cx="786581" cy="432619"/>
+              </a:xfrm>
+              <a:prstGeom prst="roundRect">
+                <a:avLst/>
+              </a:prstGeom>
+              <a:solidFill>
+                <a:schemeClr val="bg1"/>
+              </a:solidFill>
+              <a:ln w="28575">
+                <a:solidFill>
+                  <a:srgbClr val="C00000"/>
+                </a:solidFill>
+              </a:ln>
+            </p:spPr>
+            <p:style>
+              <a:lnRef idx="2">
+                <a:schemeClr val="accent1">
+                  <a:shade val="50000"/>
+                </a:schemeClr>
+              </a:lnRef>
+              <a:fillRef idx="1">
+                <a:schemeClr val="accent1"/>
+              </a:fillRef>
+              <a:effectRef idx="0">
+                <a:schemeClr val="accent1"/>
+              </a:effectRef>
+              <a:fontRef idx="minor">
+                <a:schemeClr val="lt1"/>
+              </a:fontRef>
+            </p:style>
+            <p:txBody>
+              <a:bodyPr rtlCol="0" anchor="ctr"/>
+              <a:lstStyle/>
+              <a:p>
+                <a:pPr algn="ctr"/>
+                <a:endParaRPr lang="en-US"/>
+              </a:p>
+            </p:txBody>
+          </p:sp>
+          <p:sp>
+            <p:nvSpPr>
+              <p:cNvPr id="10" name="TextBox 9"/>
+              <p:cNvSpPr txBox="1"/>
+              <p:nvPr/>
+            </p:nvSpPr>
+            <p:spPr>
+              <a:xfrm>
+                <a:off x="468350" y="3303639"/>
+                <a:ext cx="662361" cy="923330"/>
+              </a:xfrm>
+              <a:prstGeom prst="rect">
+                <a:avLst/>
+              </a:prstGeom>
+              <a:noFill/>
+            </p:spPr>
+            <p:txBody>
+              <a:bodyPr wrap="none" rtlCol="0">
+                <a:spAutoFit/>
+              </a:bodyPr>
+              <a:lstStyle/>
+              <a:p>
+                <a:r>
+                  <a:rPr lang="en-US" sz="5400" dirty="0" smtClean="0"/>
+                  <a:t>…</a:t>
+                </a:r>
+                <a:endParaRPr lang="en-US" sz="5400" dirty="0"/>
+              </a:p>
+            </p:txBody>
+          </p:sp>
+        </p:grpSp>
+        <p:sp>
+          <p:nvSpPr>
+            <p:cNvPr id="12" name="TextBox 11"/>
+            <p:cNvSpPr txBox="1"/>
+            <p:nvPr/>
+          </p:nvSpPr>
+          <p:spPr>
+            <a:xfrm>
+              <a:off x="7244531" y="3091368"/>
+              <a:ext cx="896399" cy="707886"/>
+            </a:xfrm>
+            <a:prstGeom prst="rect">
+              <a:avLst/>
+            </a:prstGeom>
+            <a:noFill/>
+          </p:spPr>
+          <p:txBody>
+            <a:bodyPr wrap="none" rtlCol="0">
+              <a:spAutoFit/>
+            </a:bodyPr>
+            <a:lstStyle/>
+            <a:p>
+              <a:r>
+                <a:rPr lang="en-US" sz="4000" dirty="0" smtClean="0">
+                  <a:solidFill>
+                    <a:srgbClr val="C00000"/>
+                  </a:solidFill>
+                </a:rPr>
+                <a:t>???</a:t>
+              </a:r>
+              <a:endParaRPr lang="en-US" sz="4000" dirty="0">
+                <a:solidFill>
+                  <a:srgbClr val="C00000"/>
+                </a:solidFill>
+              </a:endParaRPr>
+            </a:p>
+          </p:txBody>
+        </p:sp>
+      </p:grpSp>
+      <p:grpSp>
+        <p:nvGrpSpPr>
+          <p:cNvPr id="15" name="Group 14"/>
+          <p:cNvGrpSpPr/>
+          <p:nvPr/>
+        </p:nvGrpSpPr>
+        <p:grpSpPr>
+          <a:xfrm>
+            <a:off x="1060808" y="4080315"/>
+            <a:ext cx="6500197" cy="1967852"/>
+            <a:chOff x="1060808" y="4080315"/>
+            <a:chExt cx="6500197" cy="1967852"/>
+          </a:xfrm>
+        </p:grpSpPr>
+        <p:sp>
+          <p:nvSpPr>
+            <p:cNvPr id="5" name="TextBox 4"/>
+            <p:cNvSpPr txBox="1"/>
+            <p:nvPr/>
+          </p:nvSpPr>
+          <p:spPr>
+            <a:xfrm>
+              <a:off x="1060808" y="4724728"/>
+              <a:ext cx="6500197" cy="1323439"/>
+            </a:xfrm>
+            <a:prstGeom prst="rect">
+              <a:avLst/>
+            </a:prstGeom>
+            <a:solidFill>
+              <a:schemeClr val="bg1">
+                <a:lumMod val="75000"/>
+              </a:schemeClr>
+            </a:solidFill>
+          </p:spPr>
+          <p:txBody>
+            <a:bodyPr wrap="square" rtlCol="0">
+              <a:spAutoFit/>
+            </a:bodyPr>
+            <a:lstStyle/>
+            <a:p>
+              <a:r>
+                <a:rPr lang="nn-NO" sz="1600" dirty="0" smtClean="0">
+                  <a:latin typeface="Courier New" pitchFamily="49" charset="0"/>
+                  <a:cs typeface="Courier New" pitchFamily="49" charset="0"/>
+                </a:rPr>
+                <a:t>template&lt;typename T&gt; void swap_val(T</a:t>
+              </a:r>
+              <a:r>
+                <a:rPr lang="nn-NO" sz="1600" dirty="0" smtClean="0">
+                  <a:latin typeface="Courier New" pitchFamily="49" charset="0"/>
+                  <a:cs typeface="Courier New" pitchFamily="49" charset="0"/>
+                </a:rPr>
+                <a:t>&amp; v1, T&amp; v2) {</a:t>
+              </a:r>
+            </a:p>
+            <a:p>
+              <a:r>
+                <a:rPr lang="nn-NO" sz="1600" dirty="0">
+                  <a:latin typeface="Courier New" pitchFamily="49" charset="0"/>
+                  <a:cs typeface="Courier New" pitchFamily="49" charset="0"/>
+                </a:rPr>
+                <a:t> </a:t>
+              </a:r>
+              <a:r>
+                <a:rPr lang="nn-NO" sz="1600" dirty="0" smtClean="0">
+                  <a:latin typeface="Courier New" pitchFamily="49" charset="0"/>
+                  <a:cs typeface="Courier New" pitchFamily="49" charset="0"/>
+                </a:rPr>
+                <a:t>   </a:t>
+              </a:r>
+              <a:r>
+                <a:rPr lang="nn-NO" sz="1600" dirty="0" smtClean="0">
+                  <a:latin typeface="Courier New" pitchFamily="49" charset="0"/>
+                  <a:cs typeface="Courier New" pitchFamily="49" charset="0"/>
+                </a:rPr>
+                <a:t>auto </a:t>
+              </a:r>
+              <a:r>
+                <a:rPr lang="nn-NO" sz="1600" dirty="0" smtClean="0">
+                  <a:latin typeface="Courier New" pitchFamily="49" charset="0"/>
+                  <a:cs typeface="Courier New" pitchFamily="49" charset="0"/>
+                </a:rPr>
+                <a:t>tmp = v1;</a:t>
+              </a:r>
+            </a:p>
+            <a:p>
+              <a:r>
+                <a:rPr lang="nn-NO" sz="1600" dirty="0">
+                  <a:latin typeface="Courier New" pitchFamily="49" charset="0"/>
+                  <a:cs typeface="Courier New" pitchFamily="49" charset="0"/>
+                </a:rPr>
+                <a:t> </a:t>
+              </a:r>
+              <a:r>
+                <a:rPr lang="nn-NO" sz="1600" dirty="0" smtClean="0">
+                  <a:latin typeface="Courier New" pitchFamily="49" charset="0"/>
+                  <a:cs typeface="Courier New" pitchFamily="49" charset="0"/>
+                </a:rPr>
+                <a:t>   v1 = v2;</a:t>
+              </a:r>
+            </a:p>
+            <a:p>
+              <a:r>
+                <a:rPr lang="nn-NO" sz="1600" dirty="0">
+                  <a:latin typeface="Courier New" pitchFamily="49" charset="0"/>
+                  <a:cs typeface="Courier New" pitchFamily="49" charset="0"/>
+                </a:rPr>
+                <a:t> </a:t>
+              </a:r>
+              <a:r>
+                <a:rPr lang="nn-NO" sz="1600" dirty="0" smtClean="0">
+                  <a:latin typeface="Courier New" pitchFamily="49" charset="0"/>
+                  <a:cs typeface="Courier New" pitchFamily="49" charset="0"/>
+                </a:rPr>
+                <a:t>   v2 = tmp;</a:t>
+              </a:r>
+            </a:p>
+            <a:p>
+              <a:r>
+                <a:rPr lang="nn-NO" sz="1600" dirty="0">
+                  <a:latin typeface="Courier New" pitchFamily="49" charset="0"/>
+                  <a:cs typeface="Courier New" pitchFamily="49" charset="0"/>
+                </a:rPr>
+                <a:t>}</a:t>
+              </a:r>
+            </a:p>
+          </p:txBody>
+        </p:sp>
+        <p:cxnSp>
+          <p:nvCxnSpPr>
+            <p:cNvPr id="14" name="Straight Arrow Connector 13"/>
+            <p:cNvCxnSpPr/>
+            <p:nvPr/>
+          </p:nvCxnSpPr>
+          <p:spPr>
+            <a:xfrm>
+              <a:off x="4365522" y="4080315"/>
+              <a:ext cx="0" cy="556541"/>
+            </a:xfrm>
+            <a:prstGeom prst="straightConnector1">
+              <a:avLst/>
+            </a:prstGeom>
+            <a:ln w="57150">
+              <a:solidFill>
+                <a:schemeClr val="tx1"/>
+              </a:solidFill>
+              <a:tailEnd type="stealth"/>
+            </a:ln>
+          </p:spPr>
+          <p:style>
+            <a:lnRef idx="1">
+              <a:schemeClr val="accent1"/>
+            </a:lnRef>
+            <a:fillRef idx="0">
+              <a:schemeClr val="accent1"/>
+            </a:fillRef>
+            <a:effectRef idx="0">
+              <a:schemeClr val="accent1"/>
+            </a:effectRef>
+            <a:fontRef idx="minor">
+              <a:schemeClr val="tx1"/>
+            </a:fontRef>
+          </p:style>
+        </p:cxnSp>
+      </p:grpSp>
     </p:spTree>
     <p:extLst>
       <p:ext uri="{BB962C8B-B14F-4D97-AF65-F5344CB8AC3E}">
@@ -4210,9 +4459,6 @@
                     <p:cTn id="3" fill="hold">
                       <p:stCondLst>
                         <p:cond delay="indefinite"/>
-                        <p:cond evt="onBegin" delay="0">
-                          <p:tn val="2"/>
-                        </p:cond>
                       </p:stCondLst>
                       <p:childTnLst>
                         <p:par>
@@ -4222,7 +4468,7 @@
                             </p:stCondLst>
                             <p:childTnLst>
                               <p:par>
-                                <p:cTn id="5" presetID="1" presetClass="entr" presetSubtype="0" fill="hold" grpId="0" nodeType="withEffect">
+                                <p:cTn id="5" presetID="1" presetClass="entr" presetSubtype="0" fill="hold" grpId="0" nodeType="clickEffect">
                                   <p:stCondLst>
                                     <p:cond delay="0"/>
                                   </p:stCondLst>
@@ -4235,7 +4481,7 @@
                                           </p:stCondLst>
                                         </p:cTn>
                                         <p:tgtEl>
-                                          <p:spTgt spid="6"/>
+                                          <p:spTgt spid="8"/>
                                         </p:tgtEl>
                                         <p:attrNameLst>
                                           <p:attrName>style.visibility</p:attrName>
@@ -4248,21 +4494,84 @@
                                   </p:childTnLst>
                                 </p:cTn>
                               </p:par>
+                            </p:childTnLst>
+                          </p:cTn>
+                        </p:par>
+                      </p:childTnLst>
+                    </p:cTn>
+                  </p:par>
+                  <p:par>
+                    <p:cTn id="7" fill="hold">
+                      <p:stCondLst>
+                        <p:cond delay="indefinite"/>
+                      </p:stCondLst>
+                      <p:childTnLst>
+                        <p:par>
+                          <p:cTn id="8" fill="hold">
+                            <p:stCondLst>
+                              <p:cond delay="0"/>
+                            </p:stCondLst>
+                            <p:childTnLst>
                               <p:par>
-                                <p:cTn id="7" presetID="1" presetClass="entr" presetSubtype="0" fill="hold" grpId="0" nodeType="withEffect">
+                                <p:cTn id="9" presetID="1" presetClass="entr" presetSubtype="0" fill="hold" nodeType="clickEffect">
                                   <p:stCondLst>
                                     <p:cond delay="0"/>
                                   </p:stCondLst>
                                   <p:childTnLst>
                                     <p:set>
                                       <p:cBhvr>
-                                        <p:cTn id="8" dur="1" fill="hold">
+                                        <p:cTn id="10" dur="1" fill="hold">
                                           <p:stCondLst>
                                             <p:cond delay="0"/>
                                           </p:stCondLst>
                                         </p:cTn>
                                         <p:tgtEl>
-                                          <p:spTgt spid="8"/>
+                                          <p:spTgt spid="16"/>
+                                        </p:tgtEl>
+                                        <p:attrNameLst>
+                                          <p:attrName>style.visibility</p:attrName>
+                                        </p:attrNameLst>
+                                      </p:cBhvr>
+                                      <p:to>
+                                        <p:strVal val="visible"/>
+                                      </p:to>
+                                    </p:set>
+                                  </p:childTnLst>
+                                </p:cTn>
+                              </p:par>
+                            </p:childTnLst>
+                          </p:cTn>
+                        </p:par>
+                      </p:childTnLst>
+                    </p:cTn>
+                  </p:par>
+                  <p:par>
+                    <p:cTn id="11" fill="hold">
+                      <p:stCondLst>
+                        <p:cond delay="indefinite"/>
+                      </p:stCondLst>
+                      <p:childTnLst>
+                        <p:par>
+                          <p:cTn id="12" fill="hold">
+                            <p:stCondLst>
+                              <p:cond delay="0"/>
+                            </p:stCondLst>
+                            <p:childTnLst>
+                              <p:par>
+                                <p:cTn id="13" presetID="1" presetClass="entr" presetSubtype="0" fill="hold" nodeType="clickEffect">
+                                  <p:stCondLst>
+                                    <p:cond delay="0"/>
+                                  </p:stCondLst>
+                                  <p:childTnLst>
+                                    <p:set>
+                                      <p:cBhvr>
+                                        <p:cTn id="14" dur="1" fill="hold">
+                                          <p:stCondLst>
+                                            <p:cond delay="0"/>
+                                          </p:stCondLst>
+                                        </p:cTn>
+                                        <p:tgtEl>
+                                          <p:spTgt spid="15"/>
                                         </p:tgtEl>
                                         <p:attrNameLst>
                                           <p:attrName>style.visibility</p:attrName>
@@ -4303,7 +4612,6 @@
       </p:par>
     </p:tnLst>
     <p:bldLst>
-      <p:bldP spid="6" grpId="0" animBg="1"/>
       <p:bldP spid="8" grpId="0" animBg="1"/>
     </p:bldLst>
   </p:timing>

</xml_diff>

<commit_message>
Added slide on variadic templates
</commit_message>
<xml_diff>
--- a/CPlusPlus/05_essential_cpp_templates.pptx
+++ b/CPlusPlus/05_essential_cpp_templates.pptx
@@ -5,13 +5,14 @@
     <p:sldMasterId id="2147483660" r:id="rId1"/>
   </p:sldMasterIdLst>
   <p:notesMasterIdLst>
-    <p:notesMasterId r:id="rId6"/>
+    <p:notesMasterId r:id="rId7"/>
   </p:notesMasterIdLst>
   <p:sldIdLst>
     <p:sldId id="257" r:id="rId2"/>
     <p:sldId id="258" r:id="rId3"/>
     <p:sldId id="259" r:id="rId4"/>
-    <p:sldId id="260" r:id="rId5"/>
+    <p:sldId id="261" r:id="rId5"/>
+    <p:sldId id="260" r:id="rId6"/>
   </p:sldIdLst>
   <p:sldSz cx="9144000" cy="6858000" type="screen4x3"/>
   <p:notesSz cx="6858000" cy="9144000"/>
@@ -3755,8 +3756,8 @@
         </p:nvSpPr>
         <p:spPr>
           <a:xfrm>
-            <a:off x="304186" y="1527083"/>
-            <a:ext cx="3848100" cy="1569660"/>
+            <a:off x="478707" y="1682819"/>
+            <a:ext cx="4093293" cy="1323439"/>
           </a:xfrm>
           <a:prstGeom prst="rect">
             <a:avLst/>
@@ -3941,8 +3942,8 @@
         </p:nvSpPr>
         <p:spPr>
           <a:xfrm>
-            <a:off x="2762864" y="2121872"/>
-            <a:ext cx="4265357" cy="1569660"/>
+            <a:off x="3205931" y="2274020"/>
+            <a:ext cx="4798141" cy="1323439"/>
           </a:xfrm>
           <a:prstGeom prst="rect">
             <a:avLst/>
@@ -4134,7 +4135,7 @@
         </p:nvGrpSpPr>
         <p:grpSpPr>
           <a:xfrm>
-            <a:off x="6457950" y="3017356"/>
+            <a:off x="7399042" y="2942583"/>
             <a:ext cx="1682980" cy="979878"/>
             <a:chOff x="6457950" y="2819376"/>
             <a:chExt cx="1682980" cy="979878"/>
@@ -4280,7 +4281,7 @@
         </p:nvGrpSpPr>
         <p:grpSpPr>
           <a:xfrm>
-            <a:off x="1060808" y="4080315"/>
+            <a:off x="1218125" y="4247463"/>
             <a:ext cx="6500197" cy="1967852"/>
             <a:chOff x="1060808" y="4080315"/>
             <a:chExt cx="6500197" cy="1967852"/>
@@ -4651,6 +4652,357 @@
           <a:lstStyle/>
           <a:p>
             <a:r>
+              <a:rPr lang="en-US" dirty="0" err="1" smtClean="0"/>
+              <a:t>Variadic</a:t>
+            </a:r>
+            <a:r>
+              <a:rPr lang="en-US" dirty="0" smtClean="0"/>
+              <a:t> templates</a:t>
+            </a:r>
+            <a:endParaRPr lang="en-US" dirty="0"/>
+          </a:p>
+        </p:txBody>
+      </p:sp>
+      <p:sp>
+        <p:nvSpPr>
+          <p:cNvPr id="5" name="Content Placeholder 4"/>
+          <p:cNvSpPr>
+            <a:spLocks noGrp="1"/>
+          </p:cNvSpPr>
+          <p:nvPr>
+            <p:ph idx="1"/>
+          </p:nvPr>
+        </p:nvSpPr>
+        <p:spPr/>
+        <p:txBody>
+          <a:bodyPr/>
+          <a:lstStyle/>
+          <a:p>
+            <a:r>
+              <a:rPr lang="en-US" dirty="0" smtClean="0"/>
+              <a:t>Implementing function with arbitrary number of arguments</a:t>
+            </a:r>
+            <a:endParaRPr lang="en-US" dirty="0"/>
+          </a:p>
+        </p:txBody>
+      </p:sp>
+      <p:sp>
+        <p:nvSpPr>
+          <p:cNvPr id="3" name="Slide Number Placeholder 2"/>
+          <p:cNvSpPr>
+            <a:spLocks noGrp="1"/>
+          </p:cNvSpPr>
+          <p:nvPr>
+            <p:ph type="sldNum" sz="quarter" idx="12"/>
+          </p:nvPr>
+        </p:nvSpPr>
+        <p:spPr/>
+        <p:txBody>
+          <a:bodyPr/>
+          <a:lstStyle/>
+          <a:p>
+            <a:fld id="{9CEF4966-5219-4577-B301-14467D565841}" type="slidenum">
+              <a:rPr lang="en-US" smtClean="0"/>
+              <a:t>4</a:t>
+            </a:fld>
+            <a:endParaRPr lang="en-US"/>
+          </a:p>
+        </p:txBody>
+      </p:sp>
+      <p:sp>
+        <p:nvSpPr>
+          <p:cNvPr id="4" name="TextBox 3"/>
+          <p:cNvSpPr txBox="1"/>
+          <p:nvPr/>
+        </p:nvSpPr>
+        <p:spPr>
+          <a:xfrm>
+            <a:off x="1029314" y="2833194"/>
+            <a:ext cx="6787332" cy="2062103"/>
+          </a:xfrm>
+          <a:prstGeom prst="rect">
+            <a:avLst/>
+          </a:prstGeom>
+          <a:solidFill>
+            <a:schemeClr val="bg1">
+              <a:lumMod val="75000"/>
+            </a:schemeClr>
+          </a:solidFill>
+          <a:ln>
+            <a:solidFill>
+              <a:schemeClr val="tx1"/>
+            </a:solidFill>
+          </a:ln>
+        </p:spPr>
+        <p:txBody>
+          <a:bodyPr wrap="square" rtlCol="0">
+            <a:spAutoFit/>
+          </a:bodyPr>
+          <a:lstStyle/>
+          <a:p>
+            <a:r>
+              <a:rPr lang="en-US" sz="1600" dirty="0" smtClean="0">
+                <a:latin typeface="Courier New" pitchFamily="49" charset="0"/>
+                <a:cs typeface="Courier New" pitchFamily="49" charset="0"/>
+              </a:rPr>
+              <a:t>double sum() { return 0.0; }</a:t>
+            </a:r>
+          </a:p>
+          <a:p>
+            <a:r>
+              <a:rPr lang="en-US" sz="1600" dirty="0" smtClean="0">
+                <a:latin typeface="Courier New" pitchFamily="49" charset="0"/>
+                <a:cs typeface="Courier New" pitchFamily="49" charset="0"/>
+              </a:rPr>
+              <a:t>template&lt;</a:t>
+            </a:r>
+            <a:r>
+              <a:rPr lang="en-US" sz="1600" dirty="0" err="1" smtClean="0">
+                <a:latin typeface="Courier New" pitchFamily="49" charset="0"/>
+                <a:cs typeface="Courier New" pitchFamily="49" charset="0"/>
+              </a:rPr>
+              <a:t>typename</a:t>
+            </a:r>
+            <a:r>
+              <a:rPr lang="en-US" sz="1600" dirty="0" smtClean="0">
+                <a:latin typeface="Courier New" pitchFamily="49" charset="0"/>
+                <a:cs typeface="Courier New" pitchFamily="49" charset="0"/>
+              </a:rPr>
+              <a:t> T, </a:t>
+            </a:r>
+            <a:r>
+              <a:rPr lang="en-US" sz="1600" dirty="0" err="1" smtClean="0">
+                <a:latin typeface="Courier New" pitchFamily="49" charset="0"/>
+                <a:cs typeface="Courier New" pitchFamily="49" charset="0"/>
+              </a:rPr>
+              <a:t>typename</a:t>
+            </a:r>
+            <a:r>
+              <a:rPr lang="en-US" sz="1600" dirty="0" smtClean="0">
+                <a:latin typeface="Courier New" pitchFamily="49" charset="0"/>
+                <a:cs typeface="Courier New" pitchFamily="49" charset="0"/>
+              </a:rPr>
+              <a:t>... Tail&gt;</a:t>
+            </a:r>
+          </a:p>
+          <a:p>
+            <a:r>
+              <a:rPr lang="en-US" sz="1600" dirty="0" smtClean="0">
+                <a:latin typeface="Courier New" pitchFamily="49" charset="0"/>
+                <a:cs typeface="Courier New" pitchFamily="49" charset="0"/>
+              </a:rPr>
+              <a:t>double sum(T head, Tail... tail) {</a:t>
+            </a:r>
+          </a:p>
+          <a:p>
+            <a:r>
+              <a:rPr lang="en-US" sz="1600" dirty="0">
+                <a:latin typeface="Courier New" pitchFamily="49" charset="0"/>
+                <a:cs typeface="Courier New" pitchFamily="49" charset="0"/>
+              </a:rPr>
+              <a:t> </a:t>
+            </a:r>
+            <a:r>
+              <a:rPr lang="en-US" sz="1600" dirty="0" smtClean="0">
+                <a:latin typeface="Courier New" pitchFamily="49" charset="0"/>
+                <a:cs typeface="Courier New" pitchFamily="49" charset="0"/>
+              </a:rPr>
+              <a:t>   return head + sum(tail...);</a:t>
+            </a:r>
+          </a:p>
+          <a:p>
+            <a:r>
+              <a:rPr lang="en-US" sz="1600" dirty="0" smtClean="0">
+                <a:latin typeface="Courier New" pitchFamily="49" charset="0"/>
+                <a:cs typeface="Courier New" pitchFamily="49" charset="0"/>
+              </a:rPr>
+              <a:t>}</a:t>
+            </a:r>
+          </a:p>
+          <a:p>
+            <a:r>
+              <a:rPr lang="en-US" sz="1600" dirty="0" smtClean="0">
+                <a:latin typeface="Courier New" pitchFamily="49" charset="0"/>
+                <a:cs typeface="Courier New" pitchFamily="49" charset="0"/>
+              </a:rPr>
+              <a:t>…</a:t>
+            </a:r>
+          </a:p>
+          <a:p>
+            <a:r>
+              <a:rPr lang="en-US" sz="1600" dirty="0" err="1" smtClean="0">
+                <a:latin typeface="Courier New" pitchFamily="49" charset="0"/>
+                <a:cs typeface="Courier New" pitchFamily="49" charset="0"/>
+              </a:rPr>
+              <a:t>std</a:t>
+            </a:r>
+            <a:r>
+              <a:rPr lang="en-US" sz="1600" dirty="0" smtClean="0">
+                <a:latin typeface="Courier New" pitchFamily="49" charset="0"/>
+                <a:cs typeface="Courier New" pitchFamily="49" charset="0"/>
+              </a:rPr>
+              <a:t>::</a:t>
+            </a:r>
+            <a:r>
+              <a:rPr lang="en-US" sz="1600" dirty="0" err="1" smtClean="0">
+                <a:latin typeface="Courier New" pitchFamily="49" charset="0"/>
+                <a:cs typeface="Courier New" pitchFamily="49" charset="0"/>
+              </a:rPr>
+              <a:t>cout</a:t>
+            </a:r>
+            <a:r>
+              <a:rPr lang="en-US" sz="1600" dirty="0" smtClean="0">
+                <a:latin typeface="Courier New" pitchFamily="49" charset="0"/>
+                <a:cs typeface="Courier New" pitchFamily="49" charset="0"/>
+              </a:rPr>
+              <a:t> &lt;&lt; sum(1.2, 2.3, 3.4) &lt;&lt; </a:t>
+            </a:r>
+            <a:r>
+              <a:rPr lang="en-US" sz="1600" dirty="0" err="1" smtClean="0">
+                <a:latin typeface="Courier New" pitchFamily="49" charset="0"/>
+                <a:cs typeface="Courier New" pitchFamily="49" charset="0"/>
+              </a:rPr>
+              <a:t>std</a:t>
+            </a:r>
+            <a:r>
+              <a:rPr lang="en-US" sz="1600" dirty="0" smtClean="0">
+                <a:latin typeface="Courier New" pitchFamily="49" charset="0"/>
+                <a:cs typeface="Courier New" pitchFamily="49" charset="0"/>
+              </a:rPr>
+              <a:t>::</a:t>
+            </a:r>
+            <a:r>
+              <a:rPr lang="en-US" sz="1600" dirty="0" err="1" smtClean="0">
+                <a:latin typeface="Courier New" pitchFamily="49" charset="0"/>
+                <a:cs typeface="Courier New" pitchFamily="49" charset="0"/>
+              </a:rPr>
+              <a:t>endl</a:t>
+            </a:r>
+            <a:r>
+              <a:rPr lang="en-US" sz="1600" dirty="0" smtClean="0">
+                <a:latin typeface="Courier New" pitchFamily="49" charset="0"/>
+                <a:cs typeface="Courier New" pitchFamily="49" charset="0"/>
+              </a:rPr>
+              <a:t>;</a:t>
+            </a:r>
+          </a:p>
+          <a:p>
+            <a:r>
+              <a:rPr lang="en-US" sz="1600" dirty="0" err="1" smtClean="0">
+                <a:latin typeface="Courier New" pitchFamily="49" charset="0"/>
+                <a:cs typeface="Courier New" pitchFamily="49" charset="0"/>
+              </a:rPr>
+              <a:t>std</a:t>
+            </a:r>
+            <a:r>
+              <a:rPr lang="en-US" sz="1600" dirty="0" smtClean="0">
+                <a:latin typeface="Courier New" pitchFamily="49" charset="0"/>
+                <a:cs typeface="Courier New" pitchFamily="49" charset="0"/>
+              </a:rPr>
+              <a:t>::</a:t>
+            </a:r>
+            <a:r>
+              <a:rPr lang="en-US" sz="1600" dirty="0" err="1" smtClean="0">
+                <a:latin typeface="Courier New" pitchFamily="49" charset="0"/>
+                <a:cs typeface="Courier New" pitchFamily="49" charset="0"/>
+              </a:rPr>
+              <a:t>cout</a:t>
+            </a:r>
+            <a:r>
+              <a:rPr lang="en-US" sz="1600" dirty="0" smtClean="0">
+                <a:latin typeface="Courier New" pitchFamily="49" charset="0"/>
+                <a:cs typeface="Courier New" pitchFamily="49" charset="0"/>
+              </a:rPr>
+              <a:t> &lt;&lt; sum(1.2, 2.3, 3.4, 4.5) &lt;&lt; </a:t>
+            </a:r>
+            <a:r>
+              <a:rPr lang="en-US" sz="1600" dirty="0" err="1" smtClean="0">
+                <a:latin typeface="Courier New" pitchFamily="49" charset="0"/>
+                <a:cs typeface="Courier New" pitchFamily="49" charset="0"/>
+              </a:rPr>
+              <a:t>std</a:t>
+            </a:r>
+            <a:r>
+              <a:rPr lang="en-US" sz="1600" dirty="0" smtClean="0">
+                <a:latin typeface="Courier New" pitchFamily="49" charset="0"/>
+                <a:cs typeface="Courier New" pitchFamily="49" charset="0"/>
+              </a:rPr>
+              <a:t>::</a:t>
+            </a:r>
+            <a:r>
+              <a:rPr lang="en-US" sz="1600" dirty="0" err="1" smtClean="0">
+                <a:latin typeface="Courier New" pitchFamily="49" charset="0"/>
+                <a:cs typeface="Courier New" pitchFamily="49" charset="0"/>
+              </a:rPr>
+              <a:t>endl</a:t>
+            </a:r>
+            <a:r>
+              <a:rPr lang="en-US" sz="1600" dirty="0" smtClean="0">
+                <a:latin typeface="Courier New" pitchFamily="49" charset="0"/>
+                <a:cs typeface="Courier New" pitchFamily="49" charset="0"/>
+              </a:rPr>
+              <a:t>;</a:t>
+            </a:r>
+            <a:endParaRPr lang="en-US" sz="1600" dirty="0" smtClean="0">
+              <a:latin typeface="Courier New" pitchFamily="49" charset="0"/>
+              <a:cs typeface="Courier New" pitchFamily="49" charset="0"/>
+            </a:endParaRPr>
+          </a:p>
+        </p:txBody>
+      </p:sp>
+    </p:spTree>
+    <p:extLst>
+      <p:ext uri="{BB962C8B-B14F-4D97-AF65-F5344CB8AC3E}">
+        <p14:creationId xmlns:p14="http://schemas.microsoft.com/office/powerpoint/2010/main" val="2544394708"/>
+      </p:ext>
+    </p:extLst>
+  </p:cSld>
+  <p:clrMapOvr>
+    <a:masterClrMapping/>
+  </p:clrMapOvr>
+  <p:timing>
+    <p:tnLst>
+      <p:par>
+        <p:cTn id="1" dur="indefinite" restart="never" nodeType="tmRoot"/>
+      </p:par>
+    </p:tnLst>
+  </p:timing>
+</p:sld>
+</file>
+
+<file path=ppt/slides/slide5.xml><?xml version="1.0" encoding="utf-8"?>
+<p:sld xmlns:a="http://schemas.openxmlformats.org/drawingml/2006/main" xmlns:r="http://schemas.openxmlformats.org/officeDocument/2006/relationships" xmlns:p="http://schemas.openxmlformats.org/presentationml/2006/main">
+  <p:cSld>
+    <p:spTree>
+      <p:nvGrpSpPr>
+        <p:cNvPr id="1" name=""/>
+        <p:cNvGrpSpPr/>
+        <p:nvPr/>
+      </p:nvGrpSpPr>
+      <p:grpSpPr>
+        <a:xfrm>
+          <a:off x="0" y="0"/>
+          <a:ext cx="0" cy="0"/>
+          <a:chOff x="0" y="0"/>
+          <a:chExt cx="0" cy="0"/>
+        </a:xfrm>
+      </p:grpSpPr>
+      <p:sp>
+        <p:nvSpPr>
+          <p:cNvPr id="2" name="Title 1"/>
+          <p:cNvSpPr>
+            <a:spLocks noGrp="1"/>
+          </p:cNvSpPr>
+          <p:nvPr>
+            <p:ph type="title"/>
+          </p:nvPr>
+        </p:nvSpPr>
+        <p:spPr/>
+        <p:txBody>
+          <a:bodyPr/>
+          <a:lstStyle/>
+          <a:p>
+            <a:r>
               <a:rPr lang="en-US" dirty="0" smtClean="0"/>
               <a:t>What was left out?</a:t>
             </a:r>
@@ -4673,6 +5025,10 @@
           <a:bodyPr/>
           <a:lstStyle/>
           <a:p>
+            <a:r>
+              <a:rPr lang="en-US" dirty="0" smtClean="0"/>
+              <a:t>Container templates, i.e., writing your own generic containers</a:t>
+            </a:r>
             <a:endParaRPr lang="en-US" dirty="0"/>
           </a:p>
         </p:txBody>
@@ -4694,7 +5050,7 @@
           <a:p>
             <a:fld id="{9CEF4966-5219-4577-B301-14467D565841}" type="slidenum">
               <a:rPr lang="en-US" smtClean="0"/>
-              <a:t>4</a:t>
+              <a:t>5</a:t>
             </a:fld>
             <a:endParaRPr lang="en-US"/>
           </a:p>
@@ -4710,6 +5066,13 @@
   <p:clrMapOvr>
     <a:masterClrMapping/>
   </p:clrMapOvr>
+  <p:timing>
+    <p:tnLst>
+      <p:par>
+        <p:cTn id="1" dur="indefinite" restart="never" nodeType="tmRoot"/>
+      </p:par>
+    </p:tnLst>
+  </p:timing>
 </p:sld>
 </file>
 

</xml_diff>

<commit_message>
Added slide on aliasasing
</commit_message>
<xml_diff>
--- a/CPlusPlus/05_essential_cpp_templates.pptx
+++ b/CPlusPlus/05_essential_cpp_templates.pptx
@@ -5,14 +5,15 @@
     <p:sldMasterId id="2147483660" r:id="rId1"/>
   </p:sldMasterIdLst>
   <p:notesMasterIdLst>
-    <p:notesMasterId r:id="rId7"/>
+    <p:notesMasterId r:id="rId8"/>
   </p:notesMasterIdLst>
   <p:sldIdLst>
     <p:sldId id="257" r:id="rId2"/>
     <p:sldId id="258" r:id="rId3"/>
     <p:sldId id="259" r:id="rId4"/>
     <p:sldId id="261" r:id="rId5"/>
-    <p:sldId id="260" r:id="rId6"/>
+    <p:sldId id="262" r:id="rId6"/>
+    <p:sldId id="260" r:id="rId7"/>
   </p:sldIdLst>
   <p:sldSz cx="9144000" cy="6858000" type="screen4x3"/>
   <p:notesSz cx="6858000" cy="9144000"/>
@@ -5004,7 +5005,7 @@
           <a:p>
             <a:r>
               <a:rPr lang="en-US" dirty="0" smtClean="0"/>
-              <a:t>What was left out?</a:t>
+              <a:t>Aliases</a:t>
             </a:r>
             <a:endParaRPr lang="en-US" dirty="0"/>
           </a:p>
@@ -5012,6 +5013,595 @@
       </p:sp>
       <p:sp>
         <p:nvSpPr>
+          <p:cNvPr id="3" name="Content Placeholder 2"/>
+          <p:cNvSpPr>
+            <a:spLocks noGrp="1"/>
+          </p:cNvSpPr>
+          <p:nvPr>
+            <p:ph idx="1"/>
+          </p:nvPr>
+        </p:nvSpPr>
+        <p:spPr/>
+        <p:txBody>
+          <a:bodyPr/>
+          <a:lstStyle/>
+          <a:p>
+            <a:r>
+              <a:rPr lang="en-US" dirty="0" smtClean="0"/>
+              <a:t>Define new name for type</a:t>
+            </a:r>
+          </a:p>
+          <a:p>
+            <a:pPr lvl="1"/>
+            <a:r>
+              <a:rPr lang="en-US" dirty="0" smtClean="0"/>
+              <a:t>more compact</a:t>
+            </a:r>
+          </a:p>
+          <a:p>
+            <a:pPr lvl="1"/>
+            <a:r>
+              <a:rPr lang="en-US" dirty="0" smtClean="0"/>
+              <a:t>easier to understand/maintain</a:t>
+            </a:r>
+            <a:endParaRPr lang="en-US" dirty="0"/>
+          </a:p>
+        </p:txBody>
+      </p:sp>
+      <p:sp>
+        <p:nvSpPr>
+          <p:cNvPr id="4" name="Slide Number Placeholder 3"/>
+          <p:cNvSpPr>
+            <a:spLocks noGrp="1"/>
+          </p:cNvSpPr>
+          <p:nvPr>
+            <p:ph type="sldNum" sz="quarter" idx="12"/>
+          </p:nvPr>
+        </p:nvSpPr>
+        <p:spPr/>
+        <p:txBody>
+          <a:bodyPr/>
+          <a:lstStyle/>
+          <a:p>
+            <a:fld id="{9CEF4966-5219-4577-B301-14467D565841}" type="slidenum">
+              <a:rPr lang="en-US" smtClean="0"/>
+              <a:t>5</a:t>
+            </a:fld>
+            <a:endParaRPr lang="en-US"/>
+          </a:p>
+        </p:txBody>
+      </p:sp>
+      <p:sp>
+        <p:nvSpPr>
+          <p:cNvPr id="5" name="TextBox 4"/>
+          <p:cNvSpPr txBox="1"/>
+          <p:nvPr/>
+        </p:nvSpPr>
+        <p:spPr>
+          <a:xfrm>
+            <a:off x="628650" y="3226481"/>
+            <a:ext cx="7219951" cy="3293209"/>
+          </a:xfrm>
+          <a:prstGeom prst="rect">
+            <a:avLst/>
+          </a:prstGeom>
+          <a:solidFill>
+            <a:schemeClr val="bg1">
+              <a:lumMod val="75000"/>
+            </a:schemeClr>
+          </a:solidFill>
+          <a:ln>
+            <a:solidFill>
+              <a:schemeClr val="tx1"/>
+            </a:solidFill>
+          </a:ln>
+        </p:spPr>
+        <p:txBody>
+          <a:bodyPr wrap="square" rtlCol="0">
+            <a:spAutoFit/>
+          </a:bodyPr>
+          <a:lstStyle/>
+          <a:p>
+            <a:r>
+              <a:rPr lang="en-US" sz="1600" dirty="0" smtClean="0">
+                <a:latin typeface="Courier New" pitchFamily="49" charset="0"/>
+                <a:cs typeface="Courier New" pitchFamily="49" charset="0"/>
+              </a:rPr>
+              <a:t>#include &lt;array&gt;</a:t>
+            </a:r>
+          </a:p>
+          <a:p>
+            <a:r>
+              <a:rPr lang="en-US" sz="1600" dirty="0" smtClean="0">
+                <a:latin typeface="Courier New" pitchFamily="49" charset="0"/>
+                <a:cs typeface="Courier New" pitchFamily="49" charset="0"/>
+              </a:rPr>
+              <a:t>#include &lt;</a:t>
+            </a:r>
+            <a:r>
+              <a:rPr lang="en-US" sz="1600" dirty="0" err="1" smtClean="0">
+                <a:latin typeface="Courier New" pitchFamily="49" charset="0"/>
+                <a:cs typeface="Courier New" pitchFamily="49" charset="0"/>
+              </a:rPr>
+              <a:t>cmath</a:t>
+            </a:r>
+            <a:r>
+              <a:rPr lang="en-US" sz="1600" dirty="0" smtClean="0">
+                <a:latin typeface="Courier New" pitchFamily="49" charset="0"/>
+                <a:cs typeface="Courier New" pitchFamily="49" charset="0"/>
+              </a:rPr>
+              <a:t>&gt;</a:t>
+            </a:r>
+          </a:p>
+          <a:p>
+            <a:endParaRPr lang="en-US" sz="1600" dirty="0">
+              <a:latin typeface="Courier New" pitchFamily="49" charset="0"/>
+              <a:cs typeface="Courier New" pitchFamily="49" charset="0"/>
+            </a:endParaRPr>
+          </a:p>
+          <a:p>
+            <a:r>
+              <a:rPr lang="en-US" sz="1600" dirty="0" smtClean="0">
+                <a:latin typeface="Courier New" pitchFamily="49" charset="0"/>
+                <a:cs typeface="Courier New" pitchFamily="49" charset="0"/>
+              </a:rPr>
+              <a:t>using </a:t>
+            </a:r>
+            <a:r>
+              <a:rPr lang="en-US" sz="1600" b="1" dirty="0" smtClean="0">
+                <a:solidFill>
+                  <a:srgbClr val="C00000"/>
+                </a:solidFill>
+                <a:latin typeface="Courier New" pitchFamily="49" charset="0"/>
+                <a:cs typeface="Courier New" pitchFamily="49" charset="0"/>
+              </a:rPr>
+              <a:t>Position</a:t>
+            </a:r>
+            <a:r>
+              <a:rPr lang="en-US" sz="1600" dirty="0" smtClean="0">
+                <a:latin typeface="Courier New" pitchFamily="49" charset="0"/>
+                <a:cs typeface="Courier New" pitchFamily="49" charset="0"/>
+              </a:rPr>
+              <a:t> = </a:t>
+            </a:r>
+            <a:r>
+              <a:rPr lang="en-US" sz="1600" dirty="0" err="1" smtClean="0">
+                <a:latin typeface="Courier New" pitchFamily="49" charset="0"/>
+                <a:cs typeface="Courier New" pitchFamily="49" charset="0"/>
+              </a:rPr>
+              <a:t>std</a:t>
+            </a:r>
+            <a:r>
+              <a:rPr lang="en-US" sz="1600" dirty="0" smtClean="0">
+                <a:latin typeface="Courier New" pitchFamily="49" charset="0"/>
+                <a:cs typeface="Courier New" pitchFamily="49" charset="0"/>
+              </a:rPr>
+              <a:t>::array&lt;double, 3&gt;;</a:t>
+            </a:r>
+          </a:p>
+          <a:p>
+            <a:endParaRPr lang="en-US" sz="1600" dirty="0" smtClean="0">
+              <a:latin typeface="Courier New" pitchFamily="49" charset="0"/>
+              <a:cs typeface="Courier New" pitchFamily="49" charset="0"/>
+            </a:endParaRPr>
+          </a:p>
+          <a:p>
+            <a:r>
+              <a:rPr lang="en-US" sz="1600" dirty="0" smtClean="0">
+                <a:latin typeface="Courier New" pitchFamily="49" charset="0"/>
+                <a:cs typeface="Courier New" pitchFamily="49" charset="0"/>
+              </a:rPr>
+              <a:t>inline double </a:t>
+            </a:r>
+            <a:r>
+              <a:rPr lang="en-US" sz="1600" dirty="0" err="1" smtClean="0">
+                <a:latin typeface="Courier New" pitchFamily="49" charset="0"/>
+                <a:cs typeface="Courier New" pitchFamily="49" charset="0"/>
+              </a:rPr>
+              <a:t>sqrt</a:t>
+            </a:r>
+            <a:r>
+              <a:rPr lang="en-US" sz="1600" dirty="0" smtClean="0">
+                <a:latin typeface="Courier New" pitchFamily="49" charset="0"/>
+                <a:cs typeface="Courier New" pitchFamily="49" charset="0"/>
+              </a:rPr>
+              <a:t>(double x) { return x*x; }</a:t>
+            </a:r>
+          </a:p>
+          <a:p>
+            <a:endParaRPr lang="en-US" sz="1600" dirty="0">
+              <a:latin typeface="Courier New" pitchFamily="49" charset="0"/>
+              <a:cs typeface="Courier New" pitchFamily="49" charset="0"/>
+            </a:endParaRPr>
+          </a:p>
+          <a:p>
+            <a:r>
+              <a:rPr lang="en-US" sz="1600" dirty="0" smtClean="0">
+                <a:latin typeface="Courier New" pitchFamily="49" charset="0"/>
+                <a:cs typeface="Courier New" pitchFamily="49" charset="0"/>
+              </a:rPr>
+              <a:t>double distance(</a:t>
+            </a:r>
+            <a:r>
+              <a:rPr lang="en-US" sz="1600" dirty="0" err="1" smtClean="0">
+                <a:latin typeface="Courier New" pitchFamily="49" charset="0"/>
+                <a:cs typeface="Courier New" pitchFamily="49" charset="0"/>
+              </a:rPr>
+              <a:t>const</a:t>
+            </a:r>
+            <a:r>
+              <a:rPr lang="en-US" sz="1600" dirty="0" smtClean="0">
+                <a:latin typeface="Courier New" pitchFamily="49" charset="0"/>
+                <a:cs typeface="Courier New" pitchFamily="49" charset="0"/>
+              </a:rPr>
+              <a:t> </a:t>
+            </a:r>
+            <a:r>
+              <a:rPr lang="en-US" sz="1600" b="1" dirty="0" smtClean="0">
+                <a:solidFill>
+                  <a:srgbClr val="C00000"/>
+                </a:solidFill>
+                <a:latin typeface="Courier New" pitchFamily="49" charset="0"/>
+                <a:cs typeface="Courier New" pitchFamily="49" charset="0"/>
+              </a:rPr>
+              <a:t>Position</a:t>
+            </a:r>
+            <a:r>
+              <a:rPr lang="en-US" sz="1600" dirty="0" smtClean="0">
+                <a:latin typeface="Courier New" pitchFamily="49" charset="0"/>
+                <a:cs typeface="Courier New" pitchFamily="49" charset="0"/>
+              </a:rPr>
+              <a:t>&amp; p1, </a:t>
+            </a:r>
+            <a:r>
+              <a:rPr lang="en-US" sz="1600" dirty="0" err="1" smtClean="0">
+                <a:latin typeface="Courier New" pitchFamily="49" charset="0"/>
+                <a:cs typeface="Courier New" pitchFamily="49" charset="0"/>
+              </a:rPr>
+              <a:t>const</a:t>
+            </a:r>
+            <a:r>
+              <a:rPr lang="en-US" sz="1600" dirty="0" smtClean="0">
+                <a:latin typeface="Courier New" pitchFamily="49" charset="0"/>
+                <a:cs typeface="Courier New" pitchFamily="49" charset="0"/>
+              </a:rPr>
+              <a:t> </a:t>
+            </a:r>
+            <a:r>
+              <a:rPr lang="en-US" sz="1600" b="1" dirty="0" smtClean="0">
+                <a:solidFill>
+                  <a:srgbClr val="C00000"/>
+                </a:solidFill>
+                <a:latin typeface="Courier New" pitchFamily="49" charset="0"/>
+                <a:cs typeface="Courier New" pitchFamily="49" charset="0"/>
+              </a:rPr>
+              <a:t>Position</a:t>
+            </a:r>
+            <a:r>
+              <a:rPr lang="en-US" sz="1600" dirty="0" smtClean="0">
+                <a:latin typeface="Courier New" pitchFamily="49" charset="0"/>
+                <a:cs typeface="Courier New" pitchFamily="49" charset="0"/>
+              </a:rPr>
+              <a:t>&amp; p2) {</a:t>
+            </a:r>
+          </a:p>
+          <a:p>
+            <a:r>
+              <a:rPr lang="en-US" sz="1600" dirty="0">
+                <a:latin typeface="Courier New" pitchFamily="49" charset="0"/>
+                <a:cs typeface="Courier New" pitchFamily="49" charset="0"/>
+              </a:rPr>
+              <a:t> </a:t>
+            </a:r>
+            <a:r>
+              <a:rPr lang="en-US" sz="1600" dirty="0" smtClean="0">
+                <a:latin typeface="Courier New" pitchFamily="49" charset="0"/>
+                <a:cs typeface="Courier New" pitchFamily="49" charset="0"/>
+              </a:rPr>
+              <a:t>   double </a:t>
+            </a:r>
+            <a:r>
+              <a:rPr lang="en-US" sz="1600" dirty="0" err="1" smtClean="0">
+                <a:latin typeface="Courier New" pitchFamily="49" charset="0"/>
+                <a:cs typeface="Courier New" pitchFamily="49" charset="0"/>
+              </a:rPr>
+              <a:t>dist</a:t>
+            </a:r>
+            <a:r>
+              <a:rPr lang="en-US" sz="1600" dirty="0" smtClean="0">
+                <a:latin typeface="Courier New" pitchFamily="49" charset="0"/>
+                <a:cs typeface="Courier New" pitchFamily="49" charset="0"/>
+              </a:rPr>
+              <a:t> {0.0};</a:t>
+            </a:r>
+          </a:p>
+          <a:p>
+            <a:r>
+              <a:rPr lang="en-US" sz="1600" dirty="0">
+                <a:latin typeface="Courier New" pitchFamily="49" charset="0"/>
+                <a:cs typeface="Courier New" pitchFamily="49" charset="0"/>
+              </a:rPr>
+              <a:t> </a:t>
+            </a:r>
+            <a:r>
+              <a:rPr lang="en-US" sz="1600" dirty="0" smtClean="0">
+                <a:latin typeface="Courier New" pitchFamily="49" charset="0"/>
+                <a:cs typeface="Courier New" pitchFamily="49" charset="0"/>
+              </a:rPr>
+              <a:t>   for (</a:t>
+            </a:r>
+            <a:r>
+              <a:rPr lang="en-US" sz="1600" dirty="0" err="1" smtClean="0">
+                <a:latin typeface="Courier New" pitchFamily="49" charset="0"/>
+                <a:cs typeface="Courier New" pitchFamily="49" charset="0"/>
+              </a:rPr>
+              <a:t>int</a:t>
+            </a:r>
+            <a:r>
+              <a:rPr lang="en-US" sz="1600" dirty="0" smtClean="0">
+                <a:latin typeface="Courier New" pitchFamily="49" charset="0"/>
+                <a:cs typeface="Courier New" pitchFamily="49" charset="0"/>
+              </a:rPr>
+              <a:t> </a:t>
+            </a:r>
+            <a:r>
+              <a:rPr lang="en-US" sz="1600" dirty="0" err="1" smtClean="0">
+                <a:latin typeface="Courier New" pitchFamily="49" charset="0"/>
+                <a:cs typeface="Courier New" pitchFamily="49" charset="0"/>
+              </a:rPr>
+              <a:t>i</a:t>
+            </a:r>
+            <a:r>
+              <a:rPr lang="en-US" sz="1600" dirty="0" smtClean="0">
+                <a:latin typeface="Courier New" pitchFamily="49" charset="0"/>
+                <a:cs typeface="Courier New" pitchFamily="49" charset="0"/>
+              </a:rPr>
+              <a:t> = 0; </a:t>
+            </a:r>
+            <a:r>
+              <a:rPr lang="en-US" sz="1600" dirty="0" err="1" smtClean="0">
+                <a:latin typeface="Courier New" pitchFamily="49" charset="0"/>
+                <a:cs typeface="Courier New" pitchFamily="49" charset="0"/>
+              </a:rPr>
+              <a:t>i</a:t>
+            </a:r>
+            <a:r>
+              <a:rPr lang="en-US" sz="1600" dirty="0" smtClean="0">
+                <a:latin typeface="Courier New" pitchFamily="49" charset="0"/>
+                <a:cs typeface="Courier New" pitchFamily="49" charset="0"/>
+              </a:rPr>
+              <a:t> &lt; p1.size(); </a:t>
+            </a:r>
+            <a:r>
+              <a:rPr lang="en-US" sz="1600" dirty="0" err="1" smtClean="0">
+                <a:latin typeface="Courier New" pitchFamily="49" charset="0"/>
+                <a:cs typeface="Courier New" pitchFamily="49" charset="0"/>
+              </a:rPr>
+              <a:t>i</a:t>
+            </a:r>
+            <a:r>
+              <a:rPr lang="en-US" sz="1600" dirty="0" smtClean="0">
+                <a:latin typeface="Courier New" pitchFamily="49" charset="0"/>
+                <a:cs typeface="Courier New" pitchFamily="49" charset="0"/>
+              </a:rPr>
+              <a:t>++)</a:t>
+            </a:r>
+          </a:p>
+          <a:p>
+            <a:r>
+              <a:rPr lang="en-US" sz="1600" dirty="0">
+                <a:latin typeface="Courier New" pitchFamily="49" charset="0"/>
+                <a:cs typeface="Courier New" pitchFamily="49" charset="0"/>
+              </a:rPr>
+              <a:t> </a:t>
+            </a:r>
+            <a:r>
+              <a:rPr lang="en-US" sz="1600" dirty="0" smtClean="0">
+                <a:latin typeface="Courier New" pitchFamily="49" charset="0"/>
+                <a:cs typeface="Courier New" pitchFamily="49" charset="0"/>
+              </a:rPr>
+              <a:t>       </a:t>
+            </a:r>
+            <a:r>
+              <a:rPr lang="en-US" sz="1600" dirty="0" err="1" smtClean="0">
+                <a:latin typeface="Courier New" pitchFamily="49" charset="0"/>
+                <a:cs typeface="Courier New" pitchFamily="49" charset="0"/>
+              </a:rPr>
+              <a:t>dist</a:t>
+            </a:r>
+            <a:r>
+              <a:rPr lang="en-US" sz="1600" dirty="0" smtClean="0">
+                <a:latin typeface="Courier New" pitchFamily="49" charset="0"/>
+                <a:cs typeface="Courier New" pitchFamily="49" charset="0"/>
+              </a:rPr>
+              <a:t> += </a:t>
+            </a:r>
+            <a:r>
+              <a:rPr lang="en-US" sz="1600" dirty="0" err="1" smtClean="0">
+                <a:latin typeface="Courier New" pitchFamily="49" charset="0"/>
+                <a:cs typeface="Courier New" pitchFamily="49" charset="0"/>
+              </a:rPr>
+              <a:t>sqr</a:t>
+            </a:r>
+            <a:r>
+              <a:rPr lang="en-US" sz="1600" dirty="0" smtClean="0">
+                <a:latin typeface="Courier New" pitchFamily="49" charset="0"/>
+                <a:cs typeface="Courier New" pitchFamily="49" charset="0"/>
+              </a:rPr>
+              <a:t>(p1[</a:t>
+            </a:r>
+            <a:r>
+              <a:rPr lang="en-US" sz="1600" dirty="0" err="1" smtClean="0">
+                <a:latin typeface="Courier New" pitchFamily="49" charset="0"/>
+                <a:cs typeface="Courier New" pitchFamily="49" charset="0"/>
+              </a:rPr>
+              <a:t>i</a:t>
+            </a:r>
+            <a:r>
+              <a:rPr lang="en-US" sz="1600" dirty="0" smtClean="0">
+                <a:latin typeface="Courier New" pitchFamily="49" charset="0"/>
+                <a:cs typeface="Courier New" pitchFamily="49" charset="0"/>
+              </a:rPr>
+              <a:t>] - p2[</a:t>
+            </a:r>
+            <a:r>
+              <a:rPr lang="en-US" sz="1600" dirty="0" err="1" smtClean="0">
+                <a:latin typeface="Courier New" pitchFamily="49" charset="0"/>
+                <a:cs typeface="Courier New" pitchFamily="49" charset="0"/>
+              </a:rPr>
+              <a:t>i</a:t>
+            </a:r>
+            <a:r>
+              <a:rPr lang="en-US" sz="1600" dirty="0" smtClean="0">
+                <a:latin typeface="Courier New" pitchFamily="49" charset="0"/>
+                <a:cs typeface="Courier New" pitchFamily="49" charset="0"/>
+              </a:rPr>
+              <a:t>]);</a:t>
+            </a:r>
+          </a:p>
+          <a:p>
+            <a:r>
+              <a:rPr lang="en-US" sz="1600" dirty="0">
+                <a:latin typeface="Courier New" pitchFamily="49" charset="0"/>
+                <a:cs typeface="Courier New" pitchFamily="49" charset="0"/>
+              </a:rPr>
+              <a:t> </a:t>
+            </a:r>
+            <a:r>
+              <a:rPr lang="en-US" sz="1600" dirty="0" smtClean="0">
+                <a:latin typeface="Courier New" pitchFamily="49" charset="0"/>
+                <a:cs typeface="Courier New" pitchFamily="49" charset="0"/>
+              </a:rPr>
+              <a:t>   return </a:t>
+            </a:r>
+            <a:r>
+              <a:rPr lang="en-US" sz="1600" dirty="0" err="1" smtClean="0">
+                <a:latin typeface="Courier New" pitchFamily="49" charset="0"/>
+                <a:cs typeface="Courier New" pitchFamily="49" charset="0"/>
+              </a:rPr>
+              <a:t>std</a:t>
+            </a:r>
+            <a:r>
+              <a:rPr lang="en-US" sz="1600" dirty="0" smtClean="0">
+                <a:latin typeface="Courier New" pitchFamily="49" charset="0"/>
+                <a:cs typeface="Courier New" pitchFamily="49" charset="0"/>
+              </a:rPr>
+              <a:t>::</a:t>
+            </a:r>
+            <a:r>
+              <a:rPr lang="en-US" sz="1600" dirty="0" err="1" smtClean="0">
+                <a:latin typeface="Courier New" pitchFamily="49" charset="0"/>
+                <a:cs typeface="Courier New" pitchFamily="49" charset="0"/>
+              </a:rPr>
+              <a:t>sqrt</a:t>
+            </a:r>
+            <a:r>
+              <a:rPr lang="en-US" sz="1600" dirty="0" smtClean="0">
+                <a:latin typeface="Courier New" pitchFamily="49" charset="0"/>
+                <a:cs typeface="Courier New" pitchFamily="49" charset="0"/>
+              </a:rPr>
+              <a:t>(</a:t>
+            </a:r>
+            <a:r>
+              <a:rPr lang="en-US" sz="1600" dirty="0" err="1" smtClean="0">
+                <a:latin typeface="Courier New" pitchFamily="49" charset="0"/>
+                <a:cs typeface="Courier New" pitchFamily="49" charset="0"/>
+              </a:rPr>
+              <a:t>dist</a:t>
+            </a:r>
+            <a:r>
+              <a:rPr lang="en-US" sz="1600" dirty="0" smtClean="0">
+                <a:latin typeface="Courier New" pitchFamily="49" charset="0"/>
+                <a:cs typeface="Courier New" pitchFamily="49" charset="0"/>
+              </a:rPr>
+              <a:t>);</a:t>
+            </a:r>
+            <a:endParaRPr lang="en-US" sz="1600" dirty="0" smtClean="0">
+              <a:latin typeface="Courier New" pitchFamily="49" charset="0"/>
+              <a:cs typeface="Courier New" pitchFamily="49" charset="0"/>
+            </a:endParaRPr>
+          </a:p>
+          <a:p>
+            <a:r>
+              <a:rPr lang="en-US" sz="1600" dirty="0">
+                <a:latin typeface="Courier New" pitchFamily="49" charset="0"/>
+                <a:cs typeface="Courier New" pitchFamily="49" charset="0"/>
+              </a:rPr>
+              <a:t>}</a:t>
+            </a:r>
+            <a:endParaRPr lang="en-US" sz="1600" dirty="0" smtClean="0">
+              <a:latin typeface="Courier New" pitchFamily="49" charset="0"/>
+              <a:cs typeface="Courier New" pitchFamily="49" charset="0"/>
+            </a:endParaRPr>
+          </a:p>
+        </p:txBody>
+      </p:sp>
+    </p:spTree>
+    <p:extLst>
+      <p:ext uri="{BB962C8B-B14F-4D97-AF65-F5344CB8AC3E}">
+        <p14:creationId xmlns:p14="http://schemas.microsoft.com/office/powerpoint/2010/main" val="428245479"/>
+      </p:ext>
+    </p:extLst>
+  </p:cSld>
+  <p:clrMapOvr>
+    <a:masterClrMapping/>
+  </p:clrMapOvr>
+  <p:timing>
+    <p:tnLst>
+      <p:par>
+        <p:cTn id="1" dur="indefinite" restart="never" nodeType="tmRoot"/>
+      </p:par>
+    </p:tnLst>
+  </p:timing>
+</p:sld>
+</file>
+
+<file path=ppt/slides/slide6.xml><?xml version="1.0" encoding="utf-8"?>
+<p:sld xmlns:a="http://schemas.openxmlformats.org/drawingml/2006/main" xmlns:r="http://schemas.openxmlformats.org/officeDocument/2006/relationships" xmlns:p="http://schemas.openxmlformats.org/presentationml/2006/main">
+  <p:cSld>
+    <p:spTree>
+      <p:nvGrpSpPr>
+        <p:cNvPr id="1" name=""/>
+        <p:cNvGrpSpPr/>
+        <p:nvPr/>
+      </p:nvGrpSpPr>
+      <p:grpSpPr>
+        <a:xfrm>
+          <a:off x="0" y="0"/>
+          <a:ext cx="0" cy="0"/>
+          <a:chOff x="0" y="0"/>
+          <a:chExt cx="0" cy="0"/>
+        </a:xfrm>
+      </p:grpSpPr>
+      <p:sp>
+        <p:nvSpPr>
+          <p:cNvPr id="2" name="Title 1"/>
+          <p:cNvSpPr>
+            <a:spLocks noGrp="1"/>
+          </p:cNvSpPr>
+          <p:nvPr>
+            <p:ph type="title"/>
+          </p:nvPr>
+        </p:nvSpPr>
+        <p:spPr/>
+        <p:txBody>
+          <a:bodyPr/>
+          <a:lstStyle/>
+          <a:p>
+            <a:r>
+              <a:rPr lang="en-US" dirty="0" smtClean="0"/>
+              <a:t>What was left </a:t>
+            </a:r>
+            <a:r>
+              <a:rPr lang="en-US" dirty="0" smtClean="0"/>
+              <a:t>out/added?</a:t>
+            </a:r>
+            <a:endParaRPr lang="en-US" dirty="0"/>
+          </a:p>
+        </p:txBody>
+      </p:sp>
+      <p:sp>
+        <p:nvSpPr>
           <p:cNvPr id="4" name="Content Placeholder 3"/>
           <p:cNvSpPr>
             <a:spLocks noGrp="1"/>
@@ -5025,10 +5615,39 @@
           <a:bodyPr/>
           <a:lstStyle/>
           <a:p>
+            <a:r>
+              <a:rPr lang="en-US" dirty="0" smtClean="0"/>
+              <a:t>Left out</a:t>
+            </a:r>
+          </a:p>
+          <a:p>
+            <a:pPr lvl="1"/>
             <a:r>
               <a:rPr lang="en-US" dirty="0" smtClean="0"/>
               <a:t>Container templates, i.e., writing your own generic containers</a:t>
             </a:r>
+          </a:p>
+          <a:p>
+            <a:pPr lvl="1"/>
+            <a:r>
+              <a:rPr lang="en-US" dirty="0" smtClean="0"/>
+              <a:t>Function objects</a:t>
+            </a:r>
+          </a:p>
+          <a:p>
+            <a:r>
+              <a:rPr lang="en-US" dirty="0" smtClean="0"/>
+              <a:t>Added</a:t>
+            </a:r>
+          </a:p>
+          <a:p>
+            <a:pPr lvl="1"/>
+            <a:r>
+              <a:rPr lang="en-US" dirty="0" smtClean="0"/>
+              <a:t>Lambda functions</a:t>
+            </a:r>
+          </a:p>
+          <a:p>
             <a:endParaRPr lang="en-US" dirty="0"/>
           </a:p>
         </p:txBody>
@@ -5050,7 +5669,7 @@
           <a:p>
             <a:fld id="{9CEF4966-5219-4577-B301-14467D565841}" type="slidenum">
               <a:rPr lang="en-US" smtClean="0"/>
-              <a:t>5</a:t>
+              <a:t>6</a:t>
             </a:fld>
             <a:endParaRPr lang="en-US"/>
           </a:p>

</xml_diff>

<commit_message>
Started slide on lambda functions
</commit_message>
<xml_diff>
--- a/CPlusPlus/05_essential_cpp_templates.pptx
+++ b/CPlusPlus/05_essential_cpp_templates.pptx
@@ -5,7 +5,7 @@
     <p:sldMasterId id="2147483660" r:id="rId1"/>
   </p:sldMasterIdLst>
   <p:notesMasterIdLst>
-    <p:notesMasterId r:id="rId8"/>
+    <p:notesMasterId r:id="rId10"/>
   </p:notesMasterIdLst>
   <p:sldIdLst>
     <p:sldId id="257" r:id="rId2"/>
@@ -13,7 +13,9 @@
     <p:sldId id="259" r:id="rId4"/>
     <p:sldId id="261" r:id="rId5"/>
     <p:sldId id="262" r:id="rId6"/>
-    <p:sldId id="260" r:id="rId7"/>
+    <p:sldId id="264" r:id="rId7"/>
+    <p:sldId id="263" r:id="rId8"/>
+    <p:sldId id="260" r:id="rId9"/>
   </p:sldIdLst>
   <p:sldSz cx="9144000" cy="6858000" type="screen4x3"/>
   <p:notesSz cx="6858000" cy="9144000"/>
@@ -5590,6 +5592,552 @@
           <a:p>
             <a:r>
               <a:rPr lang="en-US" dirty="0" smtClean="0"/>
+              <a:t>Lambda functions</a:t>
+            </a:r>
+            <a:endParaRPr lang="en-US" dirty="0"/>
+          </a:p>
+        </p:txBody>
+      </p:sp>
+      <p:sp>
+        <p:nvSpPr>
+          <p:cNvPr id="3" name="Content Placeholder 2"/>
+          <p:cNvSpPr>
+            <a:spLocks noGrp="1"/>
+          </p:cNvSpPr>
+          <p:nvPr>
+            <p:ph idx="1"/>
+          </p:nvPr>
+        </p:nvSpPr>
+        <p:spPr/>
+        <p:txBody>
+          <a:bodyPr/>
+          <a:lstStyle/>
+          <a:p>
+            <a:r>
+              <a:rPr lang="en-US" dirty="0" smtClean="0"/>
+              <a:t>Alternative to function objects</a:t>
+            </a:r>
+          </a:p>
+          <a:p>
+            <a:r>
+              <a:rPr lang="en-US" dirty="0" smtClean="0"/>
+              <a:t>Functions created at runtime</a:t>
+            </a:r>
+          </a:p>
+          <a:p>
+            <a:pPr lvl="1"/>
+            <a:r>
+              <a:rPr lang="en-US" dirty="0" smtClean="0"/>
+              <a:t>closures</a:t>
+            </a:r>
+            <a:endParaRPr lang="en-US" dirty="0"/>
+          </a:p>
+        </p:txBody>
+      </p:sp>
+      <p:sp>
+        <p:nvSpPr>
+          <p:cNvPr id="4" name="Slide Number Placeholder 3"/>
+          <p:cNvSpPr>
+            <a:spLocks noGrp="1"/>
+          </p:cNvSpPr>
+          <p:nvPr>
+            <p:ph type="sldNum" sz="quarter" idx="12"/>
+          </p:nvPr>
+        </p:nvSpPr>
+        <p:spPr/>
+        <p:txBody>
+          <a:bodyPr/>
+          <a:lstStyle/>
+          <a:p>
+            <a:fld id="{9CEF4966-5219-4577-B301-14467D565841}" type="slidenum">
+              <a:rPr lang="en-US" smtClean="0"/>
+              <a:t>6</a:t>
+            </a:fld>
+            <a:endParaRPr lang="en-US"/>
+          </a:p>
+        </p:txBody>
+      </p:sp>
+    </p:spTree>
+    <p:extLst>
+      <p:ext uri="{BB962C8B-B14F-4D97-AF65-F5344CB8AC3E}">
+        <p14:creationId xmlns:p14="http://schemas.microsoft.com/office/powerpoint/2010/main" val="2716551725"/>
+      </p:ext>
+    </p:extLst>
+  </p:cSld>
+  <p:clrMapOvr>
+    <a:masterClrMapping/>
+  </p:clrMapOvr>
+  <p:timing>
+    <p:tnLst>
+      <p:par>
+        <p:cTn id="1" dur="indefinite" restart="never" nodeType="tmRoot"/>
+      </p:par>
+    </p:tnLst>
+  </p:timing>
+</p:sld>
+</file>
+
+<file path=ppt/slides/slide7.xml><?xml version="1.0" encoding="utf-8"?>
+<p:sld xmlns:a="http://schemas.openxmlformats.org/drawingml/2006/main" xmlns:r="http://schemas.openxmlformats.org/officeDocument/2006/relationships" xmlns:p="http://schemas.openxmlformats.org/presentationml/2006/main">
+  <p:cSld>
+    <p:spTree>
+      <p:nvGrpSpPr>
+        <p:cNvPr id="1" name=""/>
+        <p:cNvGrpSpPr/>
+        <p:nvPr/>
+      </p:nvGrpSpPr>
+      <p:grpSpPr>
+        <a:xfrm>
+          <a:off x="0" y="0"/>
+          <a:ext cx="0" cy="0"/>
+          <a:chOff x="0" y="0"/>
+          <a:chExt cx="0" cy="0"/>
+        </a:xfrm>
+      </p:grpSpPr>
+      <p:sp>
+        <p:nvSpPr>
+          <p:cNvPr id="2" name="Title 1"/>
+          <p:cNvSpPr>
+            <a:spLocks noGrp="1"/>
+          </p:cNvSpPr>
+          <p:nvPr>
+            <p:ph type="title"/>
+          </p:nvPr>
+        </p:nvSpPr>
+        <p:spPr/>
+        <p:txBody>
+          <a:bodyPr/>
+          <a:lstStyle/>
+          <a:p>
+            <a:r>
+              <a:rPr lang="en-US" dirty="0" smtClean="0"/>
+              <a:t>Templates: discussion</a:t>
+            </a:r>
+            <a:endParaRPr lang="en-US" dirty="0"/>
+          </a:p>
+        </p:txBody>
+      </p:sp>
+      <p:sp>
+        <p:nvSpPr>
+          <p:cNvPr id="3" name="Content Placeholder 2"/>
+          <p:cNvSpPr>
+            <a:spLocks noGrp="1"/>
+          </p:cNvSpPr>
+          <p:nvPr>
+            <p:ph idx="1"/>
+          </p:nvPr>
+        </p:nvSpPr>
+        <p:spPr/>
+        <p:txBody>
+          <a:bodyPr/>
+          <a:lstStyle/>
+          <a:p>
+            <a:r>
+              <a:rPr lang="en-US" dirty="0" smtClean="0"/>
+              <a:t>Useful for</a:t>
+            </a:r>
+          </a:p>
+          <a:p>
+            <a:pPr lvl="1"/>
+            <a:r>
+              <a:rPr lang="en-US" dirty="0" smtClean="0"/>
+              <a:t>generic programming</a:t>
+            </a:r>
+          </a:p>
+          <a:p>
+            <a:pPr lvl="1"/>
+            <a:r>
+              <a:rPr lang="en-US" dirty="0" smtClean="0"/>
+              <a:t>expressing concepts</a:t>
+            </a:r>
+          </a:p>
+          <a:p>
+            <a:r>
+              <a:rPr lang="en-US" dirty="0" smtClean="0"/>
+              <a:t>Duck typing</a:t>
+            </a:r>
+          </a:p>
+          <a:p>
+            <a:r>
+              <a:rPr lang="en-US" dirty="0" smtClean="0"/>
+              <a:t>Caveats</a:t>
+            </a:r>
+          </a:p>
+          <a:p>
+            <a:pPr lvl="1"/>
+            <a:r>
+              <a:rPr lang="en-US" dirty="0" smtClean="0"/>
+              <a:t>errors are caught late during compilation</a:t>
+            </a:r>
+            <a:br>
+              <a:rPr lang="en-US" dirty="0" smtClean="0"/>
+            </a:br>
+            <a:r>
+              <a:rPr lang="en-US" dirty="0" smtClean="0"/>
+              <a:t>     </a:t>
+            </a:r>
+            <a:r>
+              <a:rPr lang="en-US" dirty="0" smtClean="0">
+                <a:sym typeface="Symbol" panose="05050102010706020507" pitchFamily="18" charset="2"/>
+              </a:rPr>
+              <a:t></a:t>
+            </a:r>
+            <a:r>
+              <a:rPr lang="en-US" dirty="0" smtClean="0"/>
+              <a:t>  long &amp; cryptic error messages</a:t>
+            </a:r>
+          </a:p>
+          <a:p>
+            <a:endParaRPr lang="en-US" dirty="0"/>
+          </a:p>
+        </p:txBody>
+      </p:sp>
+      <p:sp>
+        <p:nvSpPr>
+          <p:cNvPr id="4" name="Slide Number Placeholder 3"/>
+          <p:cNvSpPr>
+            <a:spLocks noGrp="1"/>
+          </p:cNvSpPr>
+          <p:nvPr>
+            <p:ph type="sldNum" sz="quarter" idx="12"/>
+          </p:nvPr>
+        </p:nvSpPr>
+        <p:spPr/>
+        <p:txBody>
+          <a:bodyPr/>
+          <a:lstStyle/>
+          <a:p>
+            <a:fld id="{9CEF4966-5219-4577-B301-14467D565841}" type="slidenum">
+              <a:rPr lang="en-US" smtClean="0"/>
+              <a:t>7</a:t>
+            </a:fld>
+            <a:endParaRPr lang="en-US"/>
+          </a:p>
+        </p:txBody>
+      </p:sp>
+    </p:spTree>
+    <p:extLst>
+      <p:ext uri="{BB962C8B-B14F-4D97-AF65-F5344CB8AC3E}">
+        <p14:creationId xmlns:p14="http://schemas.microsoft.com/office/powerpoint/2010/main" val="3443261962"/>
+      </p:ext>
+    </p:extLst>
+  </p:cSld>
+  <p:clrMapOvr>
+    <a:masterClrMapping/>
+  </p:clrMapOvr>
+  <p:timing>
+    <p:tnLst>
+      <p:par>
+        <p:cTn id="1" dur="indefinite" restart="never" nodeType="tmRoot">
+          <p:childTnLst>
+            <p:seq concurrent="1" nextAc="seek">
+              <p:cTn id="2" dur="indefinite" nodeType="mainSeq">
+                <p:childTnLst>
+                  <p:par>
+                    <p:cTn id="3" fill="hold">
+                      <p:stCondLst>
+                        <p:cond delay="indefinite"/>
+                        <p:cond evt="onBegin" delay="0">
+                          <p:tn val="2"/>
+                        </p:cond>
+                      </p:stCondLst>
+                      <p:childTnLst>
+                        <p:par>
+                          <p:cTn id="4" fill="hold">
+                            <p:stCondLst>
+                              <p:cond delay="0"/>
+                            </p:stCondLst>
+                            <p:childTnLst>
+                              <p:par>
+                                <p:cTn id="5" presetID="1" presetClass="entr" presetSubtype="0" fill="hold" grpId="0" nodeType="withEffect">
+                                  <p:stCondLst>
+                                    <p:cond delay="0"/>
+                                  </p:stCondLst>
+                                  <p:childTnLst>
+                                    <p:set>
+                                      <p:cBhvr>
+                                        <p:cTn id="6" dur="1" fill="hold">
+                                          <p:stCondLst>
+                                            <p:cond delay="0"/>
+                                          </p:stCondLst>
+                                        </p:cTn>
+                                        <p:tgtEl>
+                                          <p:spTgt spid="3">
+                                            <p:txEl>
+                                              <p:pRg st="0" end="0"/>
+                                            </p:txEl>
+                                          </p:spTgt>
+                                        </p:tgtEl>
+                                        <p:attrNameLst>
+                                          <p:attrName>style.visibility</p:attrName>
+                                        </p:attrNameLst>
+                                      </p:cBhvr>
+                                      <p:to>
+                                        <p:strVal val="visible"/>
+                                      </p:to>
+                                    </p:set>
+                                  </p:childTnLst>
+                                </p:cTn>
+                              </p:par>
+                              <p:par>
+                                <p:cTn id="7" presetID="1" presetClass="entr" presetSubtype="0" fill="hold" grpId="0" nodeType="withEffect">
+                                  <p:stCondLst>
+                                    <p:cond delay="0"/>
+                                  </p:stCondLst>
+                                  <p:childTnLst>
+                                    <p:set>
+                                      <p:cBhvr>
+                                        <p:cTn id="8" dur="1" fill="hold">
+                                          <p:stCondLst>
+                                            <p:cond delay="0"/>
+                                          </p:stCondLst>
+                                        </p:cTn>
+                                        <p:tgtEl>
+                                          <p:spTgt spid="3">
+                                            <p:txEl>
+                                              <p:pRg st="1" end="1"/>
+                                            </p:txEl>
+                                          </p:spTgt>
+                                        </p:tgtEl>
+                                        <p:attrNameLst>
+                                          <p:attrName>style.visibility</p:attrName>
+                                        </p:attrNameLst>
+                                      </p:cBhvr>
+                                      <p:to>
+                                        <p:strVal val="visible"/>
+                                      </p:to>
+                                    </p:set>
+                                  </p:childTnLst>
+                                </p:cTn>
+                              </p:par>
+                              <p:par>
+                                <p:cTn id="9" presetID="1" presetClass="entr" presetSubtype="0" fill="hold" grpId="0" nodeType="withEffect">
+                                  <p:stCondLst>
+                                    <p:cond delay="0"/>
+                                  </p:stCondLst>
+                                  <p:childTnLst>
+                                    <p:set>
+                                      <p:cBhvr>
+                                        <p:cTn id="10" dur="1" fill="hold">
+                                          <p:stCondLst>
+                                            <p:cond delay="0"/>
+                                          </p:stCondLst>
+                                        </p:cTn>
+                                        <p:tgtEl>
+                                          <p:spTgt spid="3">
+                                            <p:txEl>
+                                              <p:pRg st="2" end="2"/>
+                                            </p:txEl>
+                                          </p:spTgt>
+                                        </p:tgtEl>
+                                        <p:attrNameLst>
+                                          <p:attrName>style.visibility</p:attrName>
+                                        </p:attrNameLst>
+                                      </p:cBhvr>
+                                      <p:to>
+                                        <p:strVal val="visible"/>
+                                      </p:to>
+                                    </p:set>
+                                  </p:childTnLst>
+                                </p:cTn>
+                              </p:par>
+                            </p:childTnLst>
+                          </p:cTn>
+                        </p:par>
+                      </p:childTnLst>
+                    </p:cTn>
+                  </p:par>
+                  <p:par>
+                    <p:cTn id="11" fill="hold">
+                      <p:stCondLst>
+                        <p:cond delay="indefinite"/>
+                      </p:stCondLst>
+                      <p:childTnLst>
+                        <p:par>
+                          <p:cTn id="12" fill="hold">
+                            <p:stCondLst>
+                              <p:cond delay="0"/>
+                            </p:stCondLst>
+                            <p:childTnLst>
+                              <p:par>
+                                <p:cTn id="13" presetID="1" presetClass="entr" presetSubtype="0" fill="hold" grpId="0" nodeType="clickEffect">
+                                  <p:stCondLst>
+                                    <p:cond delay="0"/>
+                                  </p:stCondLst>
+                                  <p:childTnLst>
+                                    <p:set>
+                                      <p:cBhvr>
+                                        <p:cTn id="14" dur="1" fill="hold">
+                                          <p:stCondLst>
+                                            <p:cond delay="0"/>
+                                          </p:stCondLst>
+                                        </p:cTn>
+                                        <p:tgtEl>
+                                          <p:spTgt spid="3">
+                                            <p:txEl>
+                                              <p:pRg st="3" end="3"/>
+                                            </p:txEl>
+                                          </p:spTgt>
+                                        </p:tgtEl>
+                                        <p:attrNameLst>
+                                          <p:attrName>style.visibility</p:attrName>
+                                        </p:attrNameLst>
+                                      </p:cBhvr>
+                                      <p:to>
+                                        <p:strVal val="visible"/>
+                                      </p:to>
+                                    </p:set>
+                                  </p:childTnLst>
+                                </p:cTn>
+                              </p:par>
+                            </p:childTnLst>
+                          </p:cTn>
+                        </p:par>
+                      </p:childTnLst>
+                    </p:cTn>
+                  </p:par>
+                  <p:par>
+                    <p:cTn id="15" fill="hold">
+                      <p:stCondLst>
+                        <p:cond delay="indefinite"/>
+                      </p:stCondLst>
+                      <p:childTnLst>
+                        <p:par>
+                          <p:cTn id="16" fill="hold">
+                            <p:stCondLst>
+                              <p:cond delay="0"/>
+                            </p:stCondLst>
+                            <p:childTnLst>
+                              <p:par>
+                                <p:cTn id="17" presetID="1" presetClass="entr" presetSubtype="0" fill="hold" grpId="0" nodeType="clickEffect">
+                                  <p:stCondLst>
+                                    <p:cond delay="0"/>
+                                  </p:stCondLst>
+                                  <p:childTnLst>
+                                    <p:set>
+                                      <p:cBhvr>
+                                        <p:cTn id="18" dur="1" fill="hold">
+                                          <p:stCondLst>
+                                            <p:cond delay="0"/>
+                                          </p:stCondLst>
+                                        </p:cTn>
+                                        <p:tgtEl>
+                                          <p:spTgt spid="3">
+                                            <p:txEl>
+                                              <p:pRg st="4" end="4"/>
+                                            </p:txEl>
+                                          </p:spTgt>
+                                        </p:tgtEl>
+                                        <p:attrNameLst>
+                                          <p:attrName>style.visibility</p:attrName>
+                                        </p:attrNameLst>
+                                      </p:cBhvr>
+                                      <p:to>
+                                        <p:strVal val="visible"/>
+                                      </p:to>
+                                    </p:set>
+                                  </p:childTnLst>
+                                </p:cTn>
+                              </p:par>
+                              <p:par>
+                                <p:cTn id="19" presetID="1" presetClass="entr" presetSubtype="0" fill="hold" grpId="0" nodeType="withEffect">
+                                  <p:stCondLst>
+                                    <p:cond delay="0"/>
+                                  </p:stCondLst>
+                                  <p:childTnLst>
+                                    <p:set>
+                                      <p:cBhvr>
+                                        <p:cTn id="20" dur="1" fill="hold">
+                                          <p:stCondLst>
+                                            <p:cond delay="0"/>
+                                          </p:stCondLst>
+                                        </p:cTn>
+                                        <p:tgtEl>
+                                          <p:spTgt spid="3">
+                                            <p:txEl>
+                                              <p:pRg st="5" end="5"/>
+                                            </p:txEl>
+                                          </p:spTgt>
+                                        </p:tgtEl>
+                                        <p:attrNameLst>
+                                          <p:attrName>style.visibility</p:attrName>
+                                        </p:attrNameLst>
+                                      </p:cBhvr>
+                                      <p:to>
+                                        <p:strVal val="visible"/>
+                                      </p:to>
+                                    </p:set>
+                                  </p:childTnLst>
+                                </p:cTn>
+                              </p:par>
+                            </p:childTnLst>
+                          </p:cTn>
+                        </p:par>
+                      </p:childTnLst>
+                    </p:cTn>
+                  </p:par>
+                </p:childTnLst>
+              </p:cTn>
+              <p:prevCondLst>
+                <p:cond evt="onPrev" delay="0">
+                  <p:tgtEl>
+                    <p:sldTgt/>
+                  </p:tgtEl>
+                </p:cond>
+              </p:prevCondLst>
+              <p:nextCondLst>
+                <p:cond evt="onNext" delay="0">
+                  <p:tgtEl>
+                    <p:sldTgt/>
+                  </p:tgtEl>
+                </p:cond>
+              </p:nextCondLst>
+            </p:seq>
+          </p:childTnLst>
+        </p:cTn>
+      </p:par>
+    </p:tnLst>
+    <p:bldLst>
+      <p:bldP spid="3" grpId="0" uiExpand="1" build="p"/>
+    </p:bldLst>
+  </p:timing>
+</p:sld>
+</file>
+
+<file path=ppt/slides/slide8.xml><?xml version="1.0" encoding="utf-8"?>
+<p:sld xmlns:a="http://schemas.openxmlformats.org/drawingml/2006/main" xmlns:r="http://schemas.openxmlformats.org/officeDocument/2006/relationships" xmlns:p="http://schemas.openxmlformats.org/presentationml/2006/main">
+  <p:cSld>
+    <p:spTree>
+      <p:nvGrpSpPr>
+        <p:cNvPr id="1" name=""/>
+        <p:cNvGrpSpPr/>
+        <p:nvPr/>
+      </p:nvGrpSpPr>
+      <p:grpSpPr>
+        <a:xfrm>
+          <a:off x="0" y="0"/>
+          <a:ext cx="0" cy="0"/>
+          <a:chOff x="0" y="0"/>
+          <a:chExt cx="0" cy="0"/>
+        </a:xfrm>
+      </p:grpSpPr>
+      <p:sp>
+        <p:nvSpPr>
+          <p:cNvPr id="2" name="Title 1"/>
+          <p:cNvSpPr>
+            <a:spLocks noGrp="1"/>
+          </p:cNvSpPr>
+          <p:nvPr>
+            <p:ph type="title"/>
+          </p:nvPr>
+        </p:nvSpPr>
+        <p:spPr/>
+        <p:txBody>
+          <a:bodyPr/>
+          <a:lstStyle/>
+          <a:p>
+            <a:r>
+              <a:rPr lang="en-US" dirty="0" smtClean="0"/>
               <a:t>What was left </a:t>
             </a:r>
             <a:r>
@@ -5669,7 +6217,7 @@
           <a:p>
             <a:fld id="{9CEF4966-5219-4577-B301-14467D565841}" type="slidenum">
               <a:rPr lang="en-US" smtClean="0"/>
-              <a:t>6</a:t>
+              <a:t>8</a:t>
             </a:fld>
             <a:endParaRPr lang="en-US"/>
           </a:p>
@@ -5688,9 +6236,229 @@
   <p:timing>
     <p:tnLst>
       <p:par>
-        <p:cTn id="1" dur="indefinite" restart="never" nodeType="tmRoot"/>
+        <p:cTn id="1" dur="indefinite" restart="never" nodeType="tmRoot">
+          <p:childTnLst>
+            <p:seq concurrent="1" nextAc="seek">
+              <p:cTn id="2" dur="indefinite" nodeType="mainSeq">
+                <p:childTnLst>
+                  <p:par>
+                    <p:cTn id="3" fill="hold">
+                      <p:stCondLst>
+                        <p:cond delay="indefinite"/>
+                        <p:cond evt="onBegin" delay="0">
+                          <p:tn val="2"/>
+                        </p:cond>
+                      </p:stCondLst>
+                      <p:childTnLst>
+                        <p:par>
+                          <p:cTn id="4" fill="hold">
+                            <p:stCondLst>
+                              <p:cond delay="0"/>
+                            </p:stCondLst>
+                            <p:childTnLst>
+                              <p:par>
+                                <p:cTn id="5" presetID="1" presetClass="entr" presetSubtype="0" fill="hold" grpId="0" nodeType="withEffect">
+                                  <p:stCondLst>
+                                    <p:cond delay="0"/>
+                                  </p:stCondLst>
+                                  <p:childTnLst>
+                                    <p:set>
+                                      <p:cBhvr>
+                                        <p:cTn id="6" dur="1" fill="hold">
+                                          <p:stCondLst>
+                                            <p:cond delay="0"/>
+                                          </p:stCondLst>
+                                        </p:cTn>
+                                        <p:tgtEl>
+                                          <p:spTgt spid="4">
+                                            <p:txEl>
+                                              <p:pRg st="0" end="0"/>
+                                            </p:txEl>
+                                          </p:spTgt>
+                                        </p:tgtEl>
+                                        <p:attrNameLst>
+                                          <p:attrName>style.visibility</p:attrName>
+                                        </p:attrNameLst>
+                                      </p:cBhvr>
+                                      <p:to>
+                                        <p:strVal val="visible"/>
+                                      </p:to>
+                                    </p:set>
+                                  </p:childTnLst>
+                                </p:cTn>
+                              </p:par>
+                              <p:par>
+                                <p:cTn id="7" presetID="1" presetClass="entr" presetSubtype="0" fill="hold" grpId="0" nodeType="withEffect">
+                                  <p:stCondLst>
+                                    <p:cond delay="0"/>
+                                  </p:stCondLst>
+                                  <p:childTnLst>
+                                    <p:set>
+                                      <p:cBhvr>
+                                        <p:cTn id="8" dur="1" fill="hold">
+                                          <p:stCondLst>
+                                            <p:cond delay="0"/>
+                                          </p:stCondLst>
+                                        </p:cTn>
+                                        <p:tgtEl>
+                                          <p:spTgt spid="4">
+                                            <p:txEl>
+                                              <p:pRg st="1" end="1"/>
+                                            </p:txEl>
+                                          </p:spTgt>
+                                        </p:tgtEl>
+                                        <p:attrNameLst>
+                                          <p:attrName>style.visibility</p:attrName>
+                                        </p:attrNameLst>
+                                      </p:cBhvr>
+                                      <p:to>
+                                        <p:strVal val="visible"/>
+                                      </p:to>
+                                    </p:set>
+                                  </p:childTnLst>
+                                </p:cTn>
+                              </p:par>
+                              <p:par>
+                                <p:cTn id="9" presetID="1" presetClass="entr" presetSubtype="0" fill="hold" grpId="0" nodeType="withEffect">
+                                  <p:stCondLst>
+                                    <p:cond delay="0"/>
+                                  </p:stCondLst>
+                                  <p:childTnLst>
+                                    <p:set>
+                                      <p:cBhvr>
+                                        <p:cTn id="10" dur="1" fill="hold">
+                                          <p:stCondLst>
+                                            <p:cond delay="0"/>
+                                          </p:stCondLst>
+                                        </p:cTn>
+                                        <p:tgtEl>
+                                          <p:spTgt spid="4">
+                                            <p:txEl>
+                                              <p:pRg st="2" end="2"/>
+                                            </p:txEl>
+                                          </p:spTgt>
+                                        </p:tgtEl>
+                                        <p:attrNameLst>
+                                          <p:attrName>style.visibility</p:attrName>
+                                        </p:attrNameLst>
+                                      </p:cBhvr>
+                                      <p:to>
+                                        <p:strVal val="visible"/>
+                                      </p:to>
+                                    </p:set>
+                                  </p:childTnLst>
+                                </p:cTn>
+                              </p:par>
+                            </p:childTnLst>
+                          </p:cTn>
+                        </p:par>
+                      </p:childTnLst>
+                    </p:cTn>
+                  </p:par>
+                  <p:par>
+                    <p:cTn id="11" fill="hold">
+                      <p:stCondLst>
+                        <p:cond delay="indefinite"/>
+                      </p:stCondLst>
+                      <p:childTnLst>
+                        <p:par>
+                          <p:cTn id="12" fill="hold">
+                            <p:stCondLst>
+                              <p:cond delay="0"/>
+                            </p:stCondLst>
+                            <p:childTnLst>
+                              <p:par>
+                                <p:cTn id="13" presetID="1" presetClass="entr" presetSubtype="0" fill="hold" grpId="0" nodeType="clickEffect">
+                                  <p:stCondLst>
+                                    <p:cond delay="0"/>
+                                  </p:stCondLst>
+                                  <p:childTnLst>
+                                    <p:set>
+                                      <p:cBhvr>
+                                        <p:cTn id="14" dur="1" fill="hold">
+                                          <p:stCondLst>
+                                            <p:cond delay="0"/>
+                                          </p:stCondLst>
+                                        </p:cTn>
+                                        <p:tgtEl>
+                                          <p:spTgt spid="4">
+                                            <p:txEl>
+                                              <p:pRg st="3" end="3"/>
+                                            </p:txEl>
+                                          </p:spTgt>
+                                        </p:tgtEl>
+                                        <p:attrNameLst>
+                                          <p:attrName>style.visibility</p:attrName>
+                                        </p:attrNameLst>
+                                      </p:cBhvr>
+                                      <p:to>
+                                        <p:strVal val="visible"/>
+                                      </p:to>
+                                    </p:set>
+                                  </p:childTnLst>
+                                </p:cTn>
+                              </p:par>
+                              <p:par>
+                                <p:cTn id="15" presetID="1" presetClass="entr" presetSubtype="0" fill="hold" grpId="0" nodeType="withEffect">
+                                  <p:stCondLst>
+                                    <p:cond delay="0"/>
+                                  </p:stCondLst>
+                                  <p:childTnLst>
+                                    <p:set>
+                                      <p:cBhvr>
+                                        <p:cTn id="16" dur="1" fill="hold">
+                                          <p:stCondLst>
+                                            <p:cond delay="0"/>
+                                          </p:stCondLst>
+                                        </p:cTn>
+                                        <p:tgtEl>
+                                          <p:spTgt spid="4">
+                                            <p:txEl>
+                                              <p:pRg st="4" end="4"/>
+                                            </p:txEl>
+                                          </p:spTgt>
+                                        </p:tgtEl>
+                                        <p:attrNameLst>
+                                          <p:attrName>style.visibility</p:attrName>
+                                        </p:attrNameLst>
+                                      </p:cBhvr>
+                                      <p:to>
+                                        <p:strVal val="visible"/>
+                                      </p:to>
+                                    </p:set>
+                                  </p:childTnLst>
+                                </p:cTn>
+                              </p:par>
+                            </p:childTnLst>
+                          </p:cTn>
+                        </p:par>
+                      </p:childTnLst>
+                    </p:cTn>
+                  </p:par>
+                </p:childTnLst>
+              </p:cTn>
+              <p:prevCondLst>
+                <p:cond evt="onPrev" delay="0">
+                  <p:tgtEl>
+                    <p:sldTgt/>
+                  </p:tgtEl>
+                </p:cond>
+              </p:prevCondLst>
+              <p:nextCondLst>
+                <p:cond evt="onNext" delay="0">
+                  <p:tgtEl>
+                    <p:sldTgt/>
+                  </p:tgtEl>
+                </p:cond>
+              </p:nextCondLst>
+            </p:seq>
+          </p:childTnLst>
+        </p:cTn>
       </p:par>
     </p:tnLst>
+    <p:bldLst>
+      <p:bldP spid="4" grpId="0" uiExpand="1" build="p"/>
+    </p:bldLst>
   </p:timing>
 </p:sld>
 </file>

</xml_diff>

<commit_message>
Added slides on parameter binding and lambda functions
</commit_message>
<xml_diff>
--- a/CPlusPlus/05_essential_cpp_templates.pptx
+++ b/CPlusPlus/05_essential_cpp_templates.pptx
@@ -7835,7 +7835,7 @@
           <a:p>
             <a:r>
               <a:rPr lang="en-US" dirty="0" smtClean="0"/>
-              <a:t>Currying with bind</a:t>
+              <a:t>Interlude: currying with bind</a:t>
             </a:r>
             <a:endParaRPr lang="en-US" dirty="0"/>
           </a:p>
@@ -7856,7 +7856,11 @@
           <a:bodyPr/>
           <a:lstStyle/>
           <a:p>
-            <a:endParaRPr lang="en-US"/>
+            <a:r>
+              <a:rPr lang="en-US" dirty="0" smtClean="0"/>
+              <a:t>Bind function arguments to values</a:t>
+            </a:r>
+            <a:endParaRPr lang="en-US" dirty="0"/>
           </a:p>
         </p:txBody>
       </p:sp>
@@ -7880,6 +7884,390 @@
               <a:t>8</a:t>
             </a:fld>
             <a:endParaRPr lang="en-US"/>
+          </a:p>
+        </p:txBody>
+      </p:sp>
+      <p:sp>
+        <p:nvSpPr>
+          <p:cNvPr id="5" name="TextBox 4"/>
+          <p:cNvSpPr txBox="1"/>
+          <p:nvPr/>
+        </p:nvSpPr>
+        <p:spPr>
+          <a:xfrm>
+            <a:off x="618818" y="2380905"/>
+            <a:ext cx="7219951" cy="2554545"/>
+          </a:xfrm>
+          <a:prstGeom prst="rect">
+            <a:avLst/>
+          </a:prstGeom>
+          <a:solidFill>
+            <a:schemeClr val="bg1">
+              <a:lumMod val="75000"/>
+            </a:schemeClr>
+          </a:solidFill>
+          <a:ln>
+            <a:solidFill>
+              <a:schemeClr val="tx1"/>
+            </a:solidFill>
+          </a:ln>
+        </p:spPr>
+        <p:txBody>
+          <a:bodyPr wrap="square" rtlCol="0">
+            <a:spAutoFit/>
+          </a:bodyPr>
+          <a:lstStyle/>
+          <a:p>
+            <a:r>
+              <a:rPr lang="en-US" sz="1600" dirty="0" smtClean="0">
+                <a:latin typeface="Courier New" pitchFamily="49" charset="0"/>
+                <a:cs typeface="Courier New" pitchFamily="49" charset="0"/>
+              </a:rPr>
+              <a:t>#include &lt;</a:t>
+            </a:r>
+            <a:r>
+              <a:rPr lang="en-US" sz="1600" b="1" dirty="0" smtClean="0">
+                <a:solidFill>
+                  <a:srgbClr val="C00000"/>
+                </a:solidFill>
+                <a:latin typeface="Courier New" pitchFamily="49" charset="0"/>
+                <a:cs typeface="Courier New" pitchFamily="49" charset="0"/>
+              </a:rPr>
+              <a:t>functional</a:t>
+            </a:r>
+            <a:r>
+              <a:rPr lang="en-US" sz="1600" dirty="0" smtClean="0">
+                <a:latin typeface="Courier New" pitchFamily="49" charset="0"/>
+                <a:cs typeface="Courier New" pitchFamily="49" charset="0"/>
+              </a:rPr>
+              <a:t>&gt;</a:t>
+            </a:r>
+          </a:p>
+          <a:p>
+            <a:r>
+              <a:rPr lang="en-US" sz="1600" dirty="0" err="1" smtClean="0">
+                <a:latin typeface="Courier New" pitchFamily="49" charset="0"/>
+                <a:cs typeface="Courier New" pitchFamily="49" charset="0"/>
+              </a:rPr>
+              <a:t>const</a:t>
+            </a:r>
+            <a:r>
+              <a:rPr lang="en-US" sz="1600" dirty="0" smtClean="0">
+                <a:latin typeface="Courier New" pitchFamily="49" charset="0"/>
+                <a:cs typeface="Courier New" pitchFamily="49" charset="0"/>
+              </a:rPr>
+              <a:t> </a:t>
+            </a:r>
+            <a:r>
+              <a:rPr lang="en-US" sz="1600" dirty="0">
+                <a:latin typeface="Courier New" pitchFamily="49" charset="0"/>
+                <a:cs typeface="Courier New" pitchFamily="49" charset="0"/>
+              </a:rPr>
+              <a:t>double pi {</a:t>
+            </a:r>
+            <a:r>
+              <a:rPr lang="en-US" sz="1600" dirty="0" err="1">
+                <a:latin typeface="Courier New" pitchFamily="49" charset="0"/>
+                <a:cs typeface="Courier New" pitchFamily="49" charset="0"/>
+              </a:rPr>
+              <a:t>acos</a:t>
+            </a:r>
+            <a:r>
+              <a:rPr lang="en-US" sz="1600" dirty="0">
+                <a:latin typeface="Courier New" pitchFamily="49" charset="0"/>
+                <a:cs typeface="Courier New" pitchFamily="49" charset="0"/>
+              </a:rPr>
+              <a:t>(-1.0)};</a:t>
+            </a:r>
+          </a:p>
+          <a:p>
+            <a:endParaRPr lang="en-US" sz="1600" dirty="0">
+              <a:latin typeface="Courier New" pitchFamily="49" charset="0"/>
+              <a:cs typeface="Courier New" pitchFamily="49" charset="0"/>
+            </a:endParaRPr>
+          </a:p>
+          <a:p>
+            <a:r>
+              <a:rPr lang="en-US" sz="1600" dirty="0">
+                <a:latin typeface="Courier New" pitchFamily="49" charset="0"/>
+                <a:cs typeface="Courier New" pitchFamily="49" charset="0"/>
+              </a:rPr>
+              <a:t>double </a:t>
+            </a:r>
+            <a:r>
+              <a:rPr lang="en-US" sz="1600" dirty="0" err="1">
+                <a:latin typeface="Courier New" pitchFamily="49" charset="0"/>
+                <a:cs typeface="Courier New" pitchFamily="49" charset="0"/>
+              </a:rPr>
+              <a:t>pendulum_func</a:t>
+            </a:r>
+            <a:r>
+              <a:rPr lang="en-US" sz="1600" dirty="0">
+                <a:latin typeface="Courier New" pitchFamily="49" charset="0"/>
+                <a:cs typeface="Courier New" pitchFamily="49" charset="0"/>
+              </a:rPr>
+              <a:t>(</a:t>
+            </a:r>
+            <a:r>
+              <a:rPr lang="en-US" sz="1600" b="1" dirty="0">
+                <a:solidFill>
+                  <a:srgbClr val="0070C0"/>
+                </a:solidFill>
+                <a:latin typeface="Courier New" pitchFamily="49" charset="0"/>
+                <a:cs typeface="Courier New" pitchFamily="49" charset="0"/>
+              </a:rPr>
+              <a:t>double t</a:t>
+            </a:r>
+            <a:r>
+              <a:rPr lang="en-US" sz="1600" b="1" dirty="0">
+                <a:latin typeface="Courier New" pitchFamily="49" charset="0"/>
+                <a:cs typeface="Courier New" pitchFamily="49" charset="0"/>
+              </a:rPr>
+              <a:t>,</a:t>
+            </a:r>
+            <a:r>
+              <a:rPr lang="en-US" sz="1600" dirty="0">
+                <a:latin typeface="Courier New" pitchFamily="49" charset="0"/>
+                <a:cs typeface="Courier New" pitchFamily="49" charset="0"/>
+              </a:rPr>
+              <a:t> </a:t>
+            </a:r>
+            <a:r>
+              <a:rPr lang="en-US" sz="1600" b="1" dirty="0">
+                <a:solidFill>
+                  <a:srgbClr val="00B050"/>
+                </a:solidFill>
+                <a:latin typeface="Courier New" pitchFamily="49" charset="0"/>
+                <a:cs typeface="Courier New" pitchFamily="49" charset="0"/>
+              </a:rPr>
+              <a:t>double </a:t>
+            </a:r>
+            <a:r>
+              <a:rPr lang="en-US" sz="1600" b="1" dirty="0" err="1">
+                <a:solidFill>
+                  <a:srgbClr val="00B050"/>
+                </a:solidFill>
+                <a:latin typeface="Courier New" pitchFamily="49" charset="0"/>
+                <a:cs typeface="Courier New" pitchFamily="49" charset="0"/>
+              </a:rPr>
+              <a:t>freq</a:t>
+            </a:r>
+            <a:r>
+              <a:rPr lang="en-US" sz="1600" dirty="0">
+                <a:latin typeface="Courier New" pitchFamily="49" charset="0"/>
+                <a:cs typeface="Courier New" pitchFamily="49" charset="0"/>
+              </a:rPr>
+              <a:t>) {</a:t>
+            </a:r>
+          </a:p>
+          <a:p>
+            <a:r>
+              <a:rPr lang="en-US" sz="1600" dirty="0">
+                <a:latin typeface="Courier New" pitchFamily="49" charset="0"/>
+                <a:cs typeface="Courier New" pitchFamily="49" charset="0"/>
+              </a:rPr>
+              <a:t>    return cos(2.0*pi*</a:t>
+            </a:r>
+            <a:r>
+              <a:rPr lang="en-US" sz="1600" dirty="0" err="1">
+                <a:latin typeface="Courier New" pitchFamily="49" charset="0"/>
+                <a:cs typeface="Courier New" pitchFamily="49" charset="0"/>
+              </a:rPr>
+              <a:t>freq</a:t>
+            </a:r>
+            <a:r>
+              <a:rPr lang="en-US" sz="1600" dirty="0">
+                <a:latin typeface="Courier New" pitchFamily="49" charset="0"/>
+                <a:cs typeface="Courier New" pitchFamily="49" charset="0"/>
+              </a:rPr>
+              <a:t>*t);</a:t>
+            </a:r>
+          </a:p>
+          <a:p>
+            <a:r>
+              <a:rPr lang="en-US" sz="1600" dirty="0">
+                <a:latin typeface="Courier New" pitchFamily="49" charset="0"/>
+                <a:cs typeface="Courier New" pitchFamily="49" charset="0"/>
+              </a:rPr>
+              <a:t>}</a:t>
+            </a:r>
+          </a:p>
+          <a:p>
+            <a:r>
+              <a:rPr lang="en-US" sz="1600" dirty="0" smtClean="0">
+                <a:latin typeface="Courier New" pitchFamily="49" charset="0"/>
+                <a:cs typeface="Courier New" pitchFamily="49" charset="0"/>
+              </a:rPr>
+              <a:t>…</a:t>
+            </a:r>
+            <a:endParaRPr lang="en-US" sz="1600" dirty="0">
+              <a:latin typeface="Courier New" pitchFamily="49" charset="0"/>
+              <a:cs typeface="Courier New" pitchFamily="49" charset="0"/>
+            </a:endParaRPr>
+          </a:p>
+          <a:p>
+            <a:r>
+              <a:rPr lang="en-US" sz="1600" b="1" dirty="0" smtClean="0">
+                <a:solidFill>
+                  <a:srgbClr val="C00000"/>
+                </a:solidFill>
+                <a:latin typeface="Courier New" pitchFamily="49" charset="0"/>
+                <a:cs typeface="Courier New" pitchFamily="49" charset="0"/>
+              </a:rPr>
+              <a:t>using </a:t>
+            </a:r>
+            <a:r>
+              <a:rPr lang="en-US" sz="1600" b="1" dirty="0">
+                <a:solidFill>
+                  <a:srgbClr val="C00000"/>
+                </a:solidFill>
+                <a:latin typeface="Courier New" pitchFamily="49" charset="0"/>
+                <a:cs typeface="Courier New" pitchFamily="49" charset="0"/>
+              </a:rPr>
+              <a:t>namespace </a:t>
+            </a:r>
+            <a:r>
+              <a:rPr lang="en-US" sz="1600" b="1" dirty="0" err="1">
+                <a:solidFill>
+                  <a:srgbClr val="C00000"/>
+                </a:solidFill>
+                <a:latin typeface="Courier New" pitchFamily="49" charset="0"/>
+                <a:cs typeface="Courier New" pitchFamily="49" charset="0"/>
+              </a:rPr>
+              <a:t>std</a:t>
+            </a:r>
+            <a:r>
+              <a:rPr lang="en-US" sz="1600" b="1" dirty="0">
+                <a:solidFill>
+                  <a:srgbClr val="C00000"/>
+                </a:solidFill>
+                <a:latin typeface="Courier New" pitchFamily="49" charset="0"/>
+                <a:cs typeface="Courier New" pitchFamily="49" charset="0"/>
+              </a:rPr>
+              <a:t>::placeholders;</a:t>
+            </a:r>
+          </a:p>
+          <a:p>
+            <a:r>
+              <a:rPr lang="en-US" sz="1600" dirty="0" smtClean="0">
+                <a:latin typeface="Courier New" pitchFamily="49" charset="0"/>
+                <a:cs typeface="Courier New" pitchFamily="49" charset="0"/>
+              </a:rPr>
+              <a:t>auto </a:t>
+            </a:r>
+            <a:r>
+              <a:rPr lang="en-US" sz="1600" dirty="0">
+                <a:latin typeface="Courier New" pitchFamily="49" charset="0"/>
+                <a:cs typeface="Courier New" pitchFamily="49" charset="0"/>
+              </a:rPr>
+              <a:t>pendulum = </a:t>
+            </a:r>
+            <a:r>
+              <a:rPr lang="en-US" sz="1600" b="1" dirty="0" err="1">
+                <a:solidFill>
+                  <a:srgbClr val="C00000"/>
+                </a:solidFill>
+                <a:latin typeface="Courier New" pitchFamily="49" charset="0"/>
+                <a:cs typeface="Courier New" pitchFamily="49" charset="0"/>
+              </a:rPr>
+              <a:t>std</a:t>
+            </a:r>
+            <a:r>
+              <a:rPr lang="en-US" sz="1600" b="1" dirty="0">
+                <a:solidFill>
+                  <a:srgbClr val="C00000"/>
+                </a:solidFill>
+                <a:latin typeface="Courier New" pitchFamily="49" charset="0"/>
+                <a:cs typeface="Courier New" pitchFamily="49" charset="0"/>
+              </a:rPr>
+              <a:t>::bind</a:t>
+            </a:r>
+            <a:r>
+              <a:rPr lang="en-US" sz="1600" dirty="0">
+                <a:latin typeface="Courier New" pitchFamily="49" charset="0"/>
+                <a:cs typeface="Courier New" pitchFamily="49" charset="0"/>
+              </a:rPr>
+              <a:t>(</a:t>
+            </a:r>
+            <a:r>
+              <a:rPr lang="en-US" sz="1600" dirty="0" err="1">
+                <a:latin typeface="Courier New" pitchFamily="49" charset="0"/>
+                <a:cs typeface="Courier New" pitchFamily="49" charset="0"/>
+              </a:rPr>
+              <a:t>pendulum_func</a:t>
+            </a:r>
+            <a:r>
+              <a:rPr lang="en-US" sz="1600" dirty="0">
+                <a:latin typeface="Courier New" pitchFamily="49" charset="0"/>
+                <a:cs typeface="Courier New" pitchFamily="49" charset="0"/>
+              </a:rPr>
+              <a:t>, </a:t>
+            </a:r>
+            <a:r>
+              <a:rPr lang="en-US" sz="1600" b="1" dirty="0">
+                <a:solidFill>
+                  <a:srgbClr val="0070C0"/>
+                </a:solidFill>
+                <a:latin typeface="Courier New" pitchFamily="49" charset="0"/>
+                <a:cs typeface="Courier New" pitchFamily="49" charset="0"/>
+              </a:rPr>
+              <a:t>_1</a:t>
+            </a:r>
+            <a:r>
+              <a:rPr lang="en-US" sz="1600" dirty="0">
+                <a:latin typeface="Courier New" pitchFamily="49" charset="0"/>
+                <a:cs typeface="Courier New" pitchFamily="49" charset="0"/>
+              </a:rPr>
+              <a:t>, </a:t>
+            </a:r>
+            <a:r>
+              <a:rPr lang="en-US" sz="1600" b="1" dirty="0" smtClean="0">
+                <a:solidFill>
+                  <a:srgbClr val="00B050"/>
+                </a:solidFill>
+                <a:latin typeface="Courier New" pitchFamily="49" charset="0"/>
+                <a:cs typeface="Courier New" pitchFamily="49" charset="0"/>
+              </a:rPr>
+              <a:t>0.5</a:t>
+            </a:r>
+            <a:r>
+              <a:rPr lang="en-US" sz="1600" dirty="0" smtClean="0">
+                <a:latin typeface="Courier New" pitchFamily="49" charset="0"/>
+                <a:cs typeface="Courier New" pitchFamily="49" charset="0"/>
+              </a:rPr>
+              <a:t>);</a:t>
+            </a:r>
+            <a:endParaRPr lang="en-US" sz="1600" dirty="0">
+              <a:latin typeface="Courier New" pitchFamily="49" charset="0"/>
+              <a:cs typeface="Courier New" pitchFamily="49" charset="0"/>
+            </a:endParaRPr>
+          </a:p>
+          <a:p>
+            <a:r>
+              <a:rPr lang="en-US" sz="1600" dirty="0" smtClean="0">
+                <a:latin typeface="Courier New" pitchFamily="49" charset="0"/>
+                <a:cs typeface="Courier New" pitchFamily="49" charset="0"/>
+              </a:rPr>
+              <a:t>integrate(pendulum</a:t>
+            </a:r>
+            <a:r>
+              <a:rPr lang="en-US" sz="1600" dirty="0">
+                <a:latin typeface="Courier New" pitchFamily="49" charset="0"/>
+                <a:cs typeface="Courier New" pitchFamily="49" charset="0"/>
+              </a:rPr>
+              <a:t>, </a:t>
+            </a:r>
+            <a:r>
+              <a:rPr lang="en-US" sz="1600" dirty="0" smtClean="0">
+                <a:latin typeface="Courier New" pitchFamily="49" charset="0"/>
+                <a:cs typeface="Courier New" pitchFamily="49" charset="0"/>
+              </a:rPr>
+              <a:t>0.01, 1.0);</a:t>
+            </a:r>
+            <a:endParaRPr lang="en-US" sz="1600" dirty="0">
+              <a:latin typeface="Courier New" pitchFamily="49" charset="0"/>
+              <a:cs typeface="Courier New" pitchFamily="49" charset="0"/>
+            </a:endParaRPr>
           </a:p>
         </p:txBody>
       </p:sp>
@@ -7937,7 +8325,11 @@
           <a:p>
             <a:r>
               <a:rPr lang="en-US" dirty="0" smtClean="0"/>
-              <a:t>Lambda functions</a:t>
+              <a:t>Interlude: lambda </a:t>
+            </a:r>
+            <a:r>
+              <a:rPr lang="en-US" dirty="0" smtClean="0"/>
+              <a:t>functions</a:t>
             </a:r>
             <a:endParaRPr lang="en-US" dirty="0"/>
           </a:p>
@@ -7960,20 +8352,19 @@
           <a:p>
             <a:r>
               <a:rPr lang="en-US" dirty="0" smtClean="0"/>
-              <a:t>Alternative to function objects</a:t>
-            </a:r>
-          </a:p>
-          <a:p>
+              <a:t>Anonymous f</a:t>
+            </a:r>
             <a:r>
               <a:rPr lang="en-US" dirty="0" smtClean="0"/>
-              <a:t>Functions created at runtime</a:t>
-            </a:r>
-          </a:p>
-          <a:p>
-            <a:pPr lvl="1"/>
+              <a:t>unction </a:t>
+            </a:r>
             <a:r>
               <a:rPr lang="en-US" dirty="0" smtClean="0"/>
-              <a:t>closures</a:t>
+              <a:t>created at </a:t>
+            </a:r>
+            <a:r>
+              <a:rPr lang="en-US" dirty="0" smtClean="0"/>
+              <a:t>runtime: closures</a:t>
             </a:r>
             <a:endParaRPr lang="en-US" dirty="0"/>
           </a:p>
@@ -7999,6 +8390,568 @@
               <a:t>9</a:t>
             </a:fld>
             <a:endParaRPr lang="en-US"/>
+          </a:p>
+        </p:txBody>
+      </p:sp>
+      <p:sp>
+        <p:nvSpPr>
+          <p:cNvPr id="5" name="TextBox 4"/>
+          <p:cNvSpPr txBox="1"/>
+          <p:nvPr/>
+        </p:nvSpPr>
+        <p:spPr>
+          <a:xfrm>
+            <a:off x="618818" y="2380905"/>
+            <a:ext cx="7423969" cy="2554545"/>
+          </a:xfrm>
+          <a:prstGeom prst="rect">
+            <a:avLst/>
+          </a:prstGeom>
+          <a:solidFill>
+            <a:schemeClr val="bg1">
+              <a:lumMod val="75000"/>
+            </a:schemeClr>
+          </a:solidFill>
+          <a:ln>
+            <a:solidFill>
+              <a:schemeClr val="tx1"/>
+            </a:solidFill>
+          </a:ln>
+        </p:spPr>
+        <p:txBody>
+          <a:bodyPr wrap="square" rtlCol="0">
+            <a:spAutoFit/>
+          </a:bodyPr>
+          <a:lstStyle/>
+          <a:p>
+            <a:r>
+              <a:rPr lang="en-US" sz="1600" dirty="0" err="1" smtClean="0">
+                <a:latin typeface="Courier New" pitchFamily="49" charset="0"/>
+                <a:cs typeface="Courier New" pitchFamily="49" charset="0"/>
+              </a:rPr>
+              <a:t>const</a:t>
+            </a:r>
+            <a:r>
+              <a:rPr lang="en-US" sz="1600" dirty="0" smtClean="0">
+                <a:latin typeface="Courier New" pitchFamily="49" charset="0"/>
+                <a:cs typeface="Courier New" pitchFamily="49" charset="0"/>
+              </a:rPr>
+              <a:t> </a:t>
+            </a:r>
+            <a:r>
+              <a:rPr lang="en-US" sz="1600" dirty="0">
+                <a:latin typeface="Courier New" pitchFamily="49" charset="0"/>
+                <a:cs typeface="Courier New" pitchFamily="49" charset="0"/>
+              </a:rPr>
+              <a:t>double pi {</a:t>
+            </a:r>
+            <a:r>
+              <a:rPr lang="en-US" sz="1600" dirty="0" err="1">
+                <a:latin typeface="Courier New" pitchFamily="49" charset="0"/>
+                <a:cs typeface="Courier New" pitchFamily="49" charset="0"/>
+              </a:rPr>
+              <a:t>acos</a:t>
+            </a:r>
+            <a:r>
+              <a:rPr lang="en-US" sz="1600" dirty="0">
+                <a:latin typeface="Courier New" pitchFamily="49" charset="0"/>
+                <a:cs typeface="Courier New" pitchFamily="49" charset="0"/>
+              </a:rPr>
+              <a:t>(-1.0)};</a:t>
+            </a:r>
+          </a:p>
+          <a:p>
+            <a:endParaRPr lang="en-US" sz="1600" dirty="0">
+              <a:latin typeface="Courier New" pitchFamily="49" charset="0"/>
+              <a:cs typeface="Courier New" pitchFamily="49" charset="0"/>
+            </a:endParaRPr>
+          </a:p>
+          <a:p>
+            <a:r>
+              <a:rPr lang="en-US" sz="1600" dirty="0">
+                <a:latin typeface="Courier New" pitchFamily="49" charset="0"/>
+                <a:cs typeface="Courier New" pitchFamily="49" charset="0"/>
+              </a:rPr>
+              <a:t>double </a:t>
+            </a:r>
+            <a:r>
+              <a:rPr lang="en-US" sz="1600" dirty="0" err="1">
+                <a:latin typeface="Courier New" pitchFamily="49" charset="0"/>
+                <a:cs typeface="Courier New" pitchFamily="49" charset="0"/>
+              </a:rPr>
+              <a:t>pendulum_func</a:t>
+            </a:r>
+            <a:r>
+              <a:rPr lang="en-US" sz="1600" dirty="0">
+                <a:latin typeface="Courier New" pitchFamily="49" charset="0"/>
+                <a:cs typeface="Courier New" pitchFamily="49" charset="0"/>
+              </a:rPr>
+              <a:t>(</a:t>
+            </a:r>
+            <a:r>
+              <a:rPr lang="en-US" sz="1600" b="1" dirty="0">
+                <a:solidFill>
+                  <a:srgbClr val="0070C0"/>
+                </a:solidFill>
+                <a:latin typeface="Courier New" pitchFamily="49" charset="0"/>
+                <a:cs typeface="Courier New" pitchFamily="49" charset="0"/>
+              </a:rPr>
+              <a:t>double t</a:t>
+            </a:r>
+            <a:r>
+              <a:rPr lang="en-US" sz="1600" b="1" dirty="0">
+                <a:latin typeface="Courier New" pitchFamily="49" charset="0"/>
+                <a:cs typeface="Courier New" pitchFamily="49" charset="0"/>
+              </a:rPr>
+              <a:t>,</a:t>
+            </a:r>
+            <a:r>
+              <a:rPr lang="en-US" sz="1600" dirty="0">
+                <a:latin typeface="Courier New" pitchFamily="49" charset="0"/>
+                <a:cs typeface="Courier New" pitchFamily="49" charset="0"/>
+              </a:rPr>
+              <a:t> </a:t>
+            </a:r>
+            <a:r>
+              <a:rPr lang="en-US" sz="1600" b="1" dirty="0">
+                <a:solidFill>
+                  <a:srgbClr val="00B050"/>
+                </a:solidFill>
+                <a:latin typeface="Courier New" pitchFamily="49" charset="0"/>
+                <a:cs typeface="Courier New" pitchFamily="49" charset="0"/>
+              </a:rPr>
+              <a:t>double </a:t>
+            </a:r>
+            <a:r>
+              <a:rPr lang="en-US" sz="1600" b="1" dirty="0" err="1">
+                <a:solidFill>
+                  <a:srgbClr val="00B050"/>
+                </a:solidFill>
+                <a:latin typeface="Courier New" pitchFamily="49" charset="0"/>
+                <a:cs typeface="Courier New" pitchFamily="49" charset="0"/>
+              </a:rPr>
+              <a:t>freq</a:t>
+            </a:r>
+            <a:r>
+              <a:rPr lang="en-US" sz="1600" dirty="0">
+                <a:latin typeface="Courier New" pitchFamily="49" charset="0"/>
+                <a:cs typeface="Courier New" pitchFamily="49" charset="0"/>
+              </a:rPr>
+              <a:t>) {</a:t>
+            </a:r>
+          </a:p>
+          <a:p>
+            <a:r>
+              <a:rPr lang="en-US" sz="1600" dirty="0">
+                <a:latin typeface="Courier New" pitchFamily="49" charset="0"/>
+                <a:cs typeface="Courier New" pitchFamily="49" charset="0"/>
+              </a:rPr>
+              <a:t>    return cos(2.0*pi*</a:t>
+            </a:r>
+            <a:r>
+              <a:rPr lang="en-US" sz="1600" dirty="0" err="1">
+                <a:latin typeface="Courier New" pitchFamily="49" charset="0"/>
+                <a:cs typeface="Courier New" pitchFamily="49" charset="0"/>
+              </a:rPr>
+              <a:t>freq</a:t>
+            </a:r>
+            <a:r>
+              <a:rPr lang="en-US" sz="1600" dirty="0">
+                <a:latin typeface="Courier New" pitchFamily="49" charset="0"/>
+                <a:cs typeface="Courier New" pitchFamily="49" charset="0"/>
+              </a:rPr>
+              <a:t>*t);</a:t>
+            </a:r>
+          </a:p>
+          <a:p>
+            <a:r>
+              <a:rPr lang="en-US" sz="1600" dirty="0">
+                <a:latin typeface="Courier New" pitchFamily="49" charset="0"/>
+                <a:cs typeface="Courier New" pitchFamily="49" charset="0"/>
+              </a:rPr>
+              <a:t>}</a:t>
+            </a:r>
+          </a:p>
+          <a:p>
+            <a:r>
+              <a:rPr lang="en-US" sz="1600" dirty="0" smtClean="0">
+                <a:latin typeface="Courier New" pitchFamily="49" charset="0"/>
+                <a:cs typeface="Courier New" pitchFamily="49" charset="0"/>
+              </a:rPr>
+              <a:t>…</a:t>
+            </a:r>
+            <a:endParaRPr lang="en-US" sz="1600" dirty="0">
+              <a:latin typeface="Courier New" pitchFamily="49" charset="0"/>
+              <a:cs typeface="Courier New" pitchFamily="49" charset="0"/>
+            </a:endParaRPr>
+          </a:p>
+          <a:p>
+            <a:r>
+              <a:rPr lang="en-US" sz="1600" dirty="0" smtClean="0">
+                <a:latin typeface="Courier New" pitchFamily="49" charset="0"/>
+                <a:cs typeface="Courier New" pitchFamily="49" charset="0"/>
+              </a:rPr>
+              <a:t>double </a:t>
+            </a:r>
+            <a:r>
+              <a:rPr lang="en-US" sz="1600" dirty="0" err="1" smtClean="0">
+                <a:latin typeface="Courier New" pitchFamily="49" charset="0"/>
+                <a:cs typeface="Courier New" pitchFamily="49" charset="0"/>
+              </a:rPr>
+              <a:t>freq</a:t>
+            </a:r>
+            <a:r>
+              <a:rPr lang="en-US" sz="1600" dirty="0" smtClean="0">
+                <a:latin typeface="Courier New" pitchFamily="49" charset="0"/>
+                <a:cs typeface="Courier New" pitchFamily="49" charset="0"/>
+              </a:rPr>
+              <a:t> {0.5};</a:t>
+            </a:r>
+          </a:p>
+          <a:p>
+            <a:r>
+              <a:rPr lang="en-US" sz="1600" dirty="0" smtClean="0">
+                <a:latin typeface="Courier New" pitchFamily="49" charset="0"/>
+                <a:cs typeface="Courier New" pitchFamily="49" charset="0"/>
+              </a:rPr>
+              <a:t>…</a:t>
+            </a:r>
+            <a:endParaRPr lang="en-US" sz="1600" dirty="0">
+              <a:latin typeface="Courier New" pitchFamily="49" charset="0"/>
+              <a:cs typeface="Courier New" pitchFamily="49" charset="0"/>
+            </a:endParaRPr>
+          </a:p>
+          <a:p>
+            <a:r>
+              <a:rPr lang="en-US" sz="1600" dirty="0" smtClean="0">
+                <a:latin typeface="Courier New" pitchFamily="49" charset="0"/>
+                <a:cs typeface="Courier New" pitchFamily="49" charset="0"/>
+              </a:rPr>
+              <a:t>integrate(</a:t>
+            </a:r>
+            <a:r>
+              <a:rPr lang="en-US" sz="1600" b="1" dirty="0" smtClean="0">
+                <a:solidFill>
+                  <a:srgbClr val="C00000"/>
+                </a:solidFill>
+                <a:latin typeface="Courier New" pitchFamily="49" charset="0"/>
+                <a:cs typeface="Courier New" pitchFamily="49" charset="0"/>
+              </a:rPr>
+              <a:t>[=](</a:t>
+            </a:r>
+            <a:r>
+              <a:rPr lang="en-US" sz="1600" b="1" dirty="0">
+                <a:solidFill>
+                  <a:srgbClr val="C00000"/>
+                </a:solidFill>
+                <a:latin typeface="Courier New" pitchFamily="49" charset="0"/>
+                <a:cs typeface="Courier New" pitchFamily="49" charset="0"/>
+              </a:rPr>
+              <a:t>double t)</a:t>
+            </a:r>
+            <a:r>
+              <a:rPr lang="en-US" sz="1600" dirty="0">
+                <a:latin typeface="Courier New" pitchFamily="49" charset="0"/>
+                <a:cs typeface="Courier New" pitchFamily="49" charset="0"/>
+              </a:rPr>
+              <a:t> </a:t>
+            </a:r>
+            <a:r>
+              <a:rPr lang="en-US" sz="1600" dirty="0" smtClean="0">
+                <a:latin typeface="Courier New" pitchFamily="49" charset="0"/>
+                <a:cs typeface="Courier New" pitchFamily="49" charset="0"/>
+              </a:rPr>
+              <a:t>{ </a:t>
+            </a:r>
+            <a:r>
+              <a:rPr lang="en-US" sz="1600" dirty="0">
+                <a:latin typeface="Courier New" pitchFamily="49" charset="0"/>
+                <a:cs typeface="Courier New" pitchFamily="49" charset="0"/>
+              </a:rPr>
+              <a:t>return </a:t>
+            </a:r>
+            <a:r>
+              <a:rPr lang="en-US" sz="1600" dirty="0" err="1">
+                <a:latin typeface="Courier New" pitchFamily="49" charset="0"/>
+                <a:cs typeface="Courier New" pitchFamily="49" charset="0"/>
+              </a:rPr>
+              <a:t>pendulum_func</a:t>
+            </a:r>
+            <a:r>
+              <a:rPr lang="en-US" sz="1600" dirty="0">
+                <a:latin typeface="Courier New" pitchFamily="49" charset="0"/>
+                <a:cs typeface="Courier New" pitchFamily="49" charset="0"/>
+              </a:rPr>
+              <a:t>(t, </a:t>
+            </a:r>
+            <a:r>
+              <a:rPr lang="en-US" sz="1600" dirty="0" err="1">
+                <a:latin typeface="Courier New" pitchFamily="49" charset="0"/>
+                <a:cs typeface="Courier New" pitchFamily="49" charset="0"/>
+              </a:rPr>
+              <a:t>freq</a:t>
+            </a:r>
+            <a:r>
+              <a:rPr lang="en-US" sz="1600" dirty="0" smtClean="0">
+                <a:latin typeface="Courier New" pitchFamily="49" charset="0"/>
+                <a:cs typeface="Courier New" pitchFamily="49" charset="0"/>
+              </a:rPr>
+              <a:t>); },</a:t>
+            </a:r>
+            <a:endParaRPr lang="en-US" sz="1600" dirty="0">
+              <a:latin typeface="Courier New" pitchFamily="49" charset="0"/>
+              <a:cs typeface="Courier New" pitchFamily="49" charset="0"/>
+            </a:endParaRPr>
+          </a:p>
+          <a:p>
+            <a:r>
+              <a:rPr lang="en-US" sz="1600" dirty="0" smtClean="0">
+                <a:latin typeface="Courier New" pitchFamily="49" charset="0"/>
+                <a:cs typeface="Courier New" pitchFamily="49" charset="0"/>
+              </a:rPr>
+              <a:t>          0.01, 1.0);</a:t>
+            </a:r>
+            <a:endParaRPr lang="en-US" sz="1600" dirty="0">
+              <a:latin typeface="Courier New" pitchFamily="49" charset="0"/>
+              <a:cs typeface="Courier New" pitchFamily="49" charset="0"/>
+            </a:endParaRPr>
+          </a:p>
+        </p:txBody>
+      </p:sp>
+      <p:grpSp>
+        <p:nvGrpSpPr>
+          <p:cNvPr id="13" name="Group 12"/>
+          <p:cNvGrpSpPr/>
+          <p:nvPr/>
+        </p:nvGrpSpPr>
+        <p:grpSpPr>
+          <a:xfrm>
+            <a:off x="2300748" y="2788317"/>
+            <a:ext cx="6668224" cy="1593899"/>
+            <a:chOff x="1750141" y="3134957"/>
+            <a:chExt cx="6668224" cy="1593899"/>
+          </a:xfrm>
+        </p:grpSpPr>
+        <p:grpSp>
+          <p:nvGrpSpPr>
+            <p:cNvPr id="6" name="Group 5"/>
+            <p:cNvGrpSpPr/>
+            <p:nvPr/>
+          </p:nvGrpSpPr>
+          <p:grpSpPr>
+            <a:xfrm>
+              <a:off x="1750141" y="3134957"/>
+              <a:ext cx="6668224" cy="1593899"/>
+              <a:chOff x="2015614" y="2375092"/>
+              <a:chExt cx="6668224" cy="1593899"/>
+            </a:xfrm>
+          </p:grpSpPr>
+          <p:sp>
+            <p:nvSpPr>
+              <p:cNvPr id="7" name="TextBox 6"/>
+              <p:cNvSpPr txBox="1"/>
+              <p:nvPr/>
+            </p:nvSpPr>
+            <p:spPr>
+              <a:xfrm>
+                <a:off x="7073717" y="2375092"/>
+                <a:ext cx="1610121" cy="646331"/>
+              </a:xfrm>
+              <a:prstGeom prst="rect">
+                <a:avLst/>
+              </a:prstGeom>
+              <a:solidFill>
+                <a:schemeClr val="bg1"/>
+              </a:solidFill>
+              <a:ln>
+                <a:solidFill>
+                  <a:schemeClr val="tx1"/>
+                </a:solidFill>
+              </a:ln>
+            </p:spPr>
+            <p:txBody>
+              <a:bodyPr wrap="square" rtlCol="0">
+                <a:spAutoFit/>
+              </a:bodyPr>
+              <a:lstStyle/>
+              <a:p>
+                <a:r>
+                  <a:rPr lang="en-US" dirty="0" smtClean="0"/>
+                  <a:t>capture </a:t>
+                </a:r>
+                <a:r>
+                  <a:rPr lang="en-US" dirty="0" err="1" smtClean="0">
+                    <a:latin typeface="Courier New" panose="02070309020205020404" pitchFamily="49" charset="0"/>
+                    <a:cs typeface="Courier New" panose="02070309020205020404" pitchFamily="49" charset="0"/>
+                  </a:rPr>
+                  <a:t>freq</a:t>
+                </a:r>
+                <a:r>
+                  <a:rPr lang="en-US" dirty="0" smtClean="0"/>
+                  <a:t/>
+                </a:r>
+                <a:br>
+                  <a:rPr lang="en-US" dirty="0" smtClean="0"/>
+                </a:br>
+                <a:r>
+                  <a:rPr lang="en-US" dirty="0" smtClean="0"/>
+                  <a:t>by value</a:t>
+                </a:r>
+                <a:endParaRPr lang="en-US" dirty="0"/>
+              </a:p>
+            </p:txBody>
+          </p:sp>
+          <p:cxnSp>
+            <p:nvCxnSpPr>
+              <p:cNvPr id="8" name="Straight Arrow Connector 7"/>
+              <p:cNvCxnSpPr>
+                <a:stCxn id="7" idx="1"/>
+              </p:cNvCxnSpPr>
+              <p:nvPr/>
+            </p:nvCxnSpPr>
+            <p:spPr>
+              <a:xfrm flipH="1">
+                <a:off x="2015614" y="2698258"/>
+                <a:ext cx="5058103" cy="1270733"/>
+              </a:xfrm>
+              <a:prstGeom prst="straightConnector1">
+                <a:avLst/>
+              </a:prstGeom>
+              <a:ln>
+                <a:solidFill>
+                  <a:schemeClr val="tx1"/>
+                </a:solidFill>
+                <a:tailEnd type="stealth" w="lg" len="lg"/>
+              </a:ln>
+            </p:spPr>
+            <p:style>
+              <a:lnRef idx="1">
+                <a:schemeClr val="accent1"/>
+              </a:lnRef>
+              <a:fillRef idx="0">
+                <a:schemeClr val="accent1"/>
+              </a:fillRef>
+              <a:effectRef idx="0">
+                <a:schemeClr val="accent1"/>
+              </a:effectRef>
+              <a:fontRef idx="minor">
+                <a:schemeClr val="tx1"/>
+              </a:fontRef>
+            </p:style>
+          </p:cxnSp>
+        </p:grpSp>
+        <p:cxnSp>
+          <p:nvCxnSpPr>
+            <p:cNvPr id="10" name="Straight Arrow Connector 9"/>
+            <p:cNvCxnSpPr>
+              <a:stCxn id="7" idx="1"/>
+            </p:cNvCxnSpPr>
+            <p:nvPr/>
+          </p:nvCxnSpPr>
+          <p:spPr>
+            <a:xfrm flipH="1">
+              <a:off x="6518787" y="3458123"/>
+              <a:ext cx="289457" cy="1255100"/>
+            </a:xfrm>
+            <a:prstGeom prst="straightConnector1">
+              <a:avLst/>
+            </a:prstGeom>
+            <a:ln>
+              <a:solidFill>
+                <a:schemeClr val="tx1"/>
+              </a:solidFill>
+              <a:tailEnd type="stealth" w="lg" len="lg"/>
+            </a:ln>
+          </p:spPr>
+          <p:style>
+            <a:lnRef idx="1">
+              <a:schemeClr val="accent1"/>
+            </a:lnRef>
+            <a:fillRef idx="0">
+              <a:schemeClr val="accent1"/>
+            </a:fillRef>
+            <a:effectRef idx="0">
+              <a:schemeClr val="accent1"/>
+            </a:effectRef>
+            <a:fontRef idx="minor">
+              <a:schemeClr val="tx1"/>
+            </a:fontRef>
+          </p:style>
+        </p:cxnSp>
+      </p:grpSp>
+      <p:sp>
+        <p:nvSpPr>
+          <p:cNvPr id="15" name="TextBox 14"/>
+          <p:cNvSpPr txBox="1"/>
+          <p:nvPr/>
+        </p:nvSpPr>
+        <p:spPr>
+          <a:xfrm>
+            <a:off x="1698613" y="5243858"/>
+            <a:ext cx="4789196" cy="1015663"/>
+          </a:xfrm>
+          <a:prstGeom prst="rect">
+            <a:avLst/>
+          </a:prstGeom>
+          <a:noFill/>
+          <a:ln>
+            <a:solidFill>
+              <a:schemeClr val="tx1"/>
+            </a:solidFill>
+          </a:ln>
+        </p:spPr>
+        <p:txBody>
+          <a:bodyPr wrap="none" rtlCol="0">
+            <a:spAutoFit/>
+          </a:bodyPr>
+          <a:lstStyle/>
+          <a:p>
+            <a:r>
+              <a:rPr lang="en-US" sz="2000" dirty="0" smtClean="0">
+                <a:latin typeface="Courier New" panose="02070309020205020404" pitchFamily="49" charset="0"/>
+                <a:cs typeface="Courier New" panose="02070309020205020404" pitchFamily="49" charset="0"/>
+              </a:rPr>
+              <a:t>[…]</a:t>
+            </a:r>
+            <a:r>
+              <a:rPr lang="en-US" sz="2000" dirty="0" smtClean="0"/>
+              <a:t>: capture variables in body from context</a:t>
+            </a:r>
+          </a:p>
+          <a:p>
+            <a:pPr marL="285750" indent="-285750">
+              <a:buFont typeface="Arial" panose="020B0604020202020204" pitchFamily="34" charset="0"/>
+              <a:buChar char="•"/>
+            </a:pPr>
+            <a:r>
+              <a:rPr lang="en-US" sz="2000" dirty="0" smtClean="0">
+                <a:latin typeface="Courier New" panose="02070309020205020404" pitchFamily="49" charset="0"/>
+                <a:cs typeface="Courier New" panose="02070309020205020404" pitchFamily="49" charset="0"/>
+              </a:rPr>
+              <a:t>[=]</a:t>
+            </a:r>
+            <a:r>
+              <a:rPr lang="en-US" sz="2000" dirty="0" smtClean="0"/>
+              <a:t>: by value</a:t>
+            </a:r>
+          </a:p>
+          <a:p>
+            <a:pPr marL="285750" indent="-285750">
+              <a:buFont typeface="Arial" panose="020B0604020202020204" pitchFamily="34" charset="0"/>
+              <a:buChar char="•"/>
+            </a:pPr>
+            <a:r>
+              <a:rPr lang="en-US" sz="2000" dirty="0" smtClean="0">
+                <a:latin typeface="Courier New" panose="02070309020205020404" pitchFamily="49" charset="0"/>
+                <a:cs typeface="Courier New" panose="02070309020205020404" pitchFamily="49" charset="0"/>
+              </a:rPr>
+              <a:t>[&amp;]</a:t>
+            </a:r>
+            <a:r>
+              <a:rPr lang="en-US" sz="2000" dirty="0" smtClean="0"/>
+              <a:t>: by reference</a:t>
+            </a:r>
+            <a:endParaRPr lang="en-US" sz="2000" dirty="0"/>
           </a:p>
         </p:txBody>
       </p:sp>
@@ -8015,7 +8968,75 @@
   <p:timing>
     <p:tnLst>
       <p:par>
-        <p:cTn id="1" dur="indefinite" restart="never" nodeType="tmRoot"/>
+        <p:cTn id="1" dur="indefinite" restart="never" nodeType="tmRoot">
+          <p:childTnLst>
+            <p:seq concurrent="1" nextAc="seek">
+              <p:cTn id="2" dur="indefinite" nodeType="mainSeq">
+                <p:childTnLst>
+                  <p:par>
+                    <p:cTn id="3" fill="hold">
+                      <p:stCondLst>
+                        <p:cond delay="indefinite"/>
+                      </p:stCondLst>
+                      <p:childTnLst>
+                        <p:par>
+                          <p:cTn id="4" fill="hold">
+                            <p:stCondLst>
+                              <p:cond delay="0"/>
+                            </p:stCondLst>
+                            <p:childTnLst>
+                              <p:par>
+                                <p:cTn id="5" presetID="1" presetClass="entr" presetSubtype="0" fill="hold" nodeType="clickEffect">
+                                  <p:stCondLst>
+                                    <p:cond delay="0"/>
+                                  </p:stCondLst>
+                                  <p:childTnLst>
+                                    <p:set>
+                                      <p:cBhvr>
+                                        <p:cTn id="6" dur="1" fill="hold">
+                                          <p:stCondLst>
+                                            <p:cond delay="0"/>
+                                          </p:stCondLst>
+                                        </p:cTn>
+                                        <p:tgtEl>
+                                          <p:spTgt spid="13"/>
+                                        </p:tgtEl>
+                                        <p:attrNameLst>
+                                          <p:attrName>style.visibility</p:attrName>
+                                        </p:attrNameLst>
+                                      </p:cBhvr>
+                                      <p:to>
+                                        <p:strVal val="visible"/>
+                                      </p:to>
+                                    </p:set>
+                                  </p:childTnLst>
+                                </p:cTn>
+                              </p:par>
+                            </p:childTnLst>
+                          </p:cTn>
+                        </p:par>
+                      </p:childTnLst>
+                    </p:cTn>
+                  </p:par>
+                </p:childTnLst>
+              </p:cTn>
+              <p:prevCondLst>
+                <p:cond evt="onPrev" delay="0">
+                  <p:tgtEl>
+                    <p:sldTgt/>
+                  </p:tgtEl>
+                </p:cond>
+              </p:prevCondLst>
+              <p:nextCondLst>
+                <p:cond evt="onNext" delay="0">
+                  <p:tgtEl>
+                    <p:sldTgt/>
+                  </p:tgtEl>
+                </p:cond>
+              </p:nextCondLst>
+            </p:seq>
+          </p:childTnLst>
+        </p:cTn>
       </p:par>
     </p:tnLst>
   </p:timing>

</xml_diff>